<commit_message>
docs: updated Sequence Diagrams for Register Command
</commit_message>
<xml_diff>
--- a/docs/diagrams/SDforRegisterCommand.pptx
+++ b/docs/diagrams/SDforRegisterCommand.pptx
@@ -5,10 +5,11 @@
     <p:sldMasterId id="2147483648" r:id="rId1"/>
   </p:sldMasterIdLst>
   <p:notesMasterIdLst>
-    <p:notesMasterId r:id="rId3"/>
+    <p:notesMasterId r:id="rId4"/>
   </p:notesMasterIdLst>
   <p:sldIdLst>
     <p:sldId id="266" r:id="rId2"/>
+    <p:sldId id="267" r:id="rId3"/>
   </p:sldIdLst>
   <p:sldSz cx="12192000" cy="6858000"/>
   <p:notesSz cx="6858000" cy="9144000"/>
@@ -208,7 +209,7 @@
           <a:p>
             <a:fld id="{F5CC4B3F-88C1-4FFA-B1B6-F41C21DC6924}" type="datetimeFigureOut">
               <a:rPr lang="en-US" smtClean="0"/>
-              <a:t>10/24/2018</a:t>
+              <a:t>11/3/2018</a:t>
             </a:fld>
             <a:endParaRPr lang="en-US"/>
           </a:p>
@@ -654,7 +655,7 @@
           <a:p>
             <a:fld id="{78C97017-6FC3-485B-9764-EAC9E56C1D49}" type="datetimeFigureOut">
               <a:rPr lang="en-US" smtClean="0"/>
-              <a:t>10/24/2018</a:t>
+              <a:t>11/3/2018</a:t>
             </a:fld>
             <a:endParaRPr lang="en-US"/>
           </a:p>
@@ -822,7 +823,7 @@
           <a:p>
             <a:fld id="{78C97017-6FC3-485B-9764-EAC9E56C1D49}" type="datetimeFigureOut">
               <a:rPr lang="en-US" smtClean="0"/>
-              <a:t>10/24/2018</a:t>
+              <a:t>11/3/2018</a:t>
             </a:fld>
             <a:endParaRPr lang="en-US"/>
           </a:p>
@@ -1000,7 +1001,7 @@
           <a:p>
             <a:fld id="{78C97017-6FC3-485B-9764-EAC9E56C1D49}" type="datetimeFigureOut">
               <a:rPr lang="en-US" smtClean="0"/>
-              <a:t>10/24/2018</a:t>
+              <a:t>11/3/2018</a:t>
             </a:fld>
             <a:endParaRPr lang="en-US"/>
           </a:p>
@@ -1168,7 +1169,7 @@
           <a:p>
             <a:fld id="{78C97017-6FC3-485B-9764-EAC9E56C1D49}" type="datetimeFigureOut">
               <a:rPr lang="en-US" smtClean="0"/>
-              <a:t>10/24/2018</a:t>
+              <a:t>11/3/2018</a:t>
             </a:fld>
             <a:endParaRPr lang="en-US"/>
           </a:p>
@@ -1413,7 +1414,7 @@
           <a:p>
             <a:fld id="{78C97017-6FC3-485B-9764-EAC9E56C1D49}" type="datetimeFigureOut">
               <a:rPr lang="en-US" smtClean="0"/>
-              <a:t>10/24/2018</a:t>
+              <a:t>11/3/2018</a:t>
             </a:fld>
             <a:endParaRPr lang="en-US"/>
           </a:p>
@@ -1698,7 +1699,7 @@
           <a:p>
             <a:fld id="{78C97017-6FC3-485B-9764-EAC9E56C1D49}" type="datetimeFigureOut">
               <a:rPr lang="en-US" smtClean="0"/>
-              <a:t>10/24/2018</a:t>
+              <a:t>11/3/2018</a:t>
             </a:fld>
             <a:endParaRPr lang="en-US"/>
           </a:p>
@@ -2117,7 +2118,7 @@
           <a:p>
             <a:fld id="{78C97017-6FC3-485B-9764-EAC9E56C1D49}" type="datetimeFigureOut">
               <a:rPr lang="en-US" smtClean="0"/>
-              <a:t>10/24/2018</a:t>
+              <a:t>11/3/2018</a:t>
             </a:fld>
             <a:endParaRPr lang="en-US"/>
           </a:p>
@@ -2234,7 +2235,7 @@
           <a:p>
             <a:fld id="{78C97017-6FC3-485B-9764-EAC9E56C1D49}" type="datetimeFigureOut">
               <a:rPr lang="en-US" smtClean="0"/>
-              <a:t>10/24/2018</a:t>
+              <a:t>11/3/2018</a:t>
             </a:fld>
             <a:endParaRPr lang="en-US"/>
           </a:p>
@@ -2329,7 +2330,7 @@
           <a:p>
             <a:fld id="{78C97017-6FC3-485B-9764-EAC9E56C1D49}" type="datetimeFigureOut">
               <a:rPr lang="en-US" smtClean="0"/>
-              <a:t>10/24/2018</a:t>
+              <a:t>11/3/2018</a:t>
             </a:fld>
             <a:endParaRPr lang="en-US"/>
           </a:p>
@@ -2604,7 +2605,7 @@
           <a:p>
             <a:fld id="{78C97017-6FC3-485B-9764-EAC9E56C1D49}" type="datetimeFigureOut">
               <a:rPr lang="en-US" smtClean="0"/>
-              <a:t>10/24/2018</a:t>
+              <a:t>11/3/2018</a:t>
             </a:fld>
             <a:endParaRPr lang="en-US"/>
           </a:p>
@@ -2856,7 +2857,7 @@
           <a:p>
             <a:fld id="{78C97017-6FC3-485B-9764-EAC9E56C1D49}" type="datetimeFigureOut">
               <a:rPr lang="en-US" smtClean="0"/>
-              <a:t>10/24/2018</a:t>
+              <a:t>11/3/2018</a:t>
             </a:fld>
             <a:endParaRPr lang="en-US"/>
           </a:p>
@@ -3070,7 +3071,7 @@
           <a:p>
             <a:fld id="{78C97017-6FC3-485B-9764-EAC9E56C1D49}" type="datetimeFigureOut">
               <a:rPr lang="en-US" smtClean="0"/>
-              <a:t>10/24/2018</a:t>
+              <a:t>11/3/2018</a:t>
             </a:fld>
             <a:endParaRPr lang="en-US"/>
           </a:p>
@@ -3549,8 +3550,8 @@
         </p:nvSpPr>
         <p:spPr>
           <a:xfrm>
-            <a:off x="2348669" y="1325979"/>
-            <a:ext cx="152400" cy="1644238"/>
+            <a:off x="2348669" y="1325978"/>
+            <a:ext cx="152400" cy="1950621"/>
           </a:xfrm>
           <a:prstGeom prst="rect">
             <a:avLst/>
@@ -3913,7 +3914,7 @@
         <p:spPr>
           <a:xfrm>
             <a:off x="3663950" y="1432343"/>
-            <a:ext cx="144016" cy="1428018"/>
+            <a:ext cx="144016" cy="1744246"/>
           </a:xfrm>
           <a:prstGeom prst="rect">
             <a:avLst/>
@@ -4400,7 +4401,7 @@
         </p:nvCxnSpPr>
         <p:spPr>
           <a:xfrm>
-            <a:off x="2510494" y="2850836"/>
+            <a:off x="2515257" y="3167060"/>
             <a:ext cx="1178856" cy="4762"/>
           </a:xfrm>
           <a:prstGeom prst="straightConnector1">
@@ -4440,7 +4441,7 @@
         </p:nvCxnSpPr>
         <p:spPr>
           <a:xfrm>
-            <a:off x="1076394" y="2967042"/>
+            <a:off x="1076394" y="3271837"/>
             <a:ext cx="1272276" cy="0"/>
           </a:xfrm>
           <a:prstGeom prst="straightConnector1">
@@ -4641,7 +4642,7 @@
         </p:nvCxnSpPr>
         <p:spPr>
           <a:xfrm>
-            <a:off x="5877056" y="1690640"/>
+            <a:off x="5867400" y="1690640"/>
             <a:ext cx="2165341" cy="1"/>
           </a:xfrm>
           <a:prstGeom prst="straightConnector1">
@@ -5474,10 +5475,2320 @@
           </a:p>
         </p:txBody>
       </p:sp>
+      <p:sp>
+        <p:nvSpPr>
+          <p:cNvPr id="44" name="Rectangle 43">
+            <a:extLst>
+              <a:ext uri="{FF2B5EF4-FFF2-40B4-BE49-F238E27FC236}">
+                <a16:creationId xmlns:a16="http://schemas.microsoft.com/office/drawing/2014/main" id="{4481AACD-891B-4663-853F-9E16377FC5EC}"/>
+              </a:ext>
+            </a:extLst>
+          </p:cNvPr>
+          <p:cNvSpPr/>
+          <p:nvPr/>
+        </p:nvSpPr>
+        <p:spPr>
+          <a:xfrm>
+            <a:off x="8037037" y="2636210"/>
+            <a:ext cx="142006" cy="441298"/>
+          </a:xfrm>
+          <a:prstGeom prst="rect">
+            <a:avLst/>
+          </a:prstGeom>
+          <a:solidFill>
+            <a:schemeClr val="accent5">
+              <a:lumMod val="75000"/>
+            </a:schemeClr>
+          </a:solidFill>
+          <a:ln>
+            <a:solidFill>
+              <a:schemeClr val="accent5">
+                <a:lumMod val="75000"/>
+              </a:schemeClr>
+            </a:solidFill>
+          </a:ln>
+          <a:effectLst/>
+        </p:spPr>
+        <p:style>
+          <a:lnRef idx="1">
+            <a:schemeClr val="accent3"/>
+          </a:lnRef>
+          <a:fillRef idx="2">
+            <a:schemeClr val="accent3"/>
+          </a:fillRef>
+          <a:effectRef idx="1">
+            <a:schemeClr val="accent3"/>
+          </a:effectRef>
+          <a:fontRef idx="minor">
+            <a:schemeClr val="dk1"/>
+          </a:fontRef>
+        </p:style>
+        <p:txBody>
+          <a:bodyPr rtlCol="0" anchor="ctr"/>
+          <a:lstStyle/>
+          <a:p>
+            <a:pPr algn="ctr"/>
+            <a:endParaRPr lang="en-SG" sz="1400"/>
+          </a:p>
+        </p:txBody>
+      </p:sp>
+      <p:cxnSp>
+        <p:nvCxnSpPr>
+          <p:cNvPr id="47" name="Straight Arrow Connector 46">
+            <a:extLst>
+              <a:ext uri="{FF2B5EF4-FFF2-40B4-BE49-F238E27FC236}">
+                <a16:creationId xmlns:a16="http://schemas.microsoft.com/office/drawing/2014/main" id="{7FC4A5E1-9DC0-4493-AC0F-DA9DC71A5D15}"/>
+              </a:ext>
+            </a:extLst>
+          </p:cNvPr>
+          <p:cNvCxnSpPr/>
+          <p:nvPr/>
+        </p:nvCxnSpPr>
+        <p:spPr>
+          <a:xfrm>
+            <a:off x="3768052" y="2636210"/>
+            <a:ext cx="4257810" cy="0"/>
+          </a:xfrm>
+          <a:prstGeom prst="straightConnector1">
+            <a:avLst/>
+          </a:prstGeom>
+          <a:ln w="19050">
+            <a:solidFill>
+              <a:srgbClr val="0070C0"/>
+            </a:solidFill>
+            <a:tailEnd type="arrow"/>
+          </a:ln>
+        </p:spPr>
+        <p:style>
+          <a:lnRef idx="1">
+            <a:schemeClr val="accent1"/>
+          </a:lnRef>
+          <a:fillRef idx="0">
+            <a:schemeClr val="accent1"/>
+          </a:fillRef>
+          <a:effectRef idx="0">
+            <a:schemeClr val="accent1"/>
+          </a:effectRef>
+          <a:fontRef idx="minor">
+            <a:schemeClr val="tx1"/>
+          </a:fontRef>
+        </p:style>
+      </p:cxnSp>
+      <p:sp>
+        <p:nvSpPr>
+          <p:cNvPr id="48" name="TextBox 47">
+            <a:extLst>
+              <a:ext uri="{FF2B5EF4-FFF2-40B4-BE49-F238E27FC236}">
+                <a16:creationId xmlns:a16="http://schemas.microsoft.com/office/drawing/2014/main" id="{FDB19C38-947E-4A01-A875-6AB1CC72CA0C}"/>
+              </a:ext>
+            </a:extLst>
+          </p:cNvPr>
+          <p:cNvSpPr txBox="1"/>
+          <p:nvPr/>
+        </p:nvSpPr>
+        <p:spPr>
+          <a:xfrm>
+            <a:off x="5867400" y="2438400"/>
+            <a:ext cx="2438400" cy="161583"/>
+          </a:xfrm>
+          <a:prstGeom prst="rect">
+            <a:avLst/>
+          </a:prstGeom>
+          <a:noFill/>
+        </p:spPr>
+        <p:txBody>
+          <a:bodyPr wrap="square" lIns="0" tIns="0" rIns="0" bIns="0" rtlCol="0">
+            <a:spAutoFit/>
+          </a:bodyPr>
+          <a:lstStyle/>
+          <a:p>
+            <a:r>
+              <a:rPr lang="en-US" sz="1050" dirty="0">
+                <a:solidFill>
+                  <a:schemeClr val="accent5">
+                    <a:lumMod val="75000"/>
+                  </a:schemeClr>
+                </a:solidFill>
+              </a:rPr>
+              <a:t>post(</a:t>
+            </a:r>
+            <a:r>
+              <a:rPr lang="en-SG" sz="1050" dirty="0" err="1">
+                <a:solidFill>
+                  <a:schemeClr val="accent5">
+                    <a:lumMod val="75000"/>
+                  </a:schemeClr>
+                </a:solidFill>
+              </a:rPr>
+              <a:t>MainWindowClearResourceEvent</a:t>
+            </a:r>
+            <a:r>
+              <a:rPr lang="en-US" sz="1050" dirty="0">
+                <a:solidFill>
+                  <a:schemeClr val="accent5">
+                    <a:lumMod val="75000"/>
+                  </a:schemeClr>
+                </a:solidFill>
+              </a:rPr>
+              <a:t>)</a:t>
+            </a:r>
+          </a:p>
+        </p:txBody>
+      </p:sp>
+      <p:cxnSp>
+        <p:nvCxnSpPr>
+          <p:cNvPr id="49" name="Straight Arrow Connector 48">
+            <a:extLst>
+              <a:ext uri="{FF2B5EF4-FFF2-40B4-BE49-F238E27FC236}">
+                <a16:creationId xmlns:a16="http://schemas.microsoft.com/office/drawing/2014/main" id="{1505E5A3-3231-4020-BCBA-AEB3DED4D143}"/>
+              </a:ext>
+            </a:extLst>
+          </p:cNvPr>
+          <p:cNvCxnSpPr/>
+          <p:nvPr/>
+        </p:nvCxnSpPr>
+        <p:spPr>
+          <a:xfrm>
+            <a:off x="3772293" y="2876815"/>
+            <a:ext cx="4257810" cy="0"/>
+          </a:xfrm>
+          <a:prstGeom prst="straightConnector1">
+            <a:avLst/>
+          </a:prstGeom>
+          <a:ln w="19050">
+            <a:solidFill>
+              <a:srgbClr val="0070C0"/>
+            </a:solidFill>
+            <a:tailEnd type="arrow"/>
+          </a:ln>
+        </p:spPr>
+        <p:style>
+          <a:lnRef idx="1">
+            <a:schemeClr val="accent1"/>
+          </a:lnRef>
+          <a:fillRef idx="0">
+            <a:schemeClr val="accent1"/>
+          </a:fillRef>
+          <a:effectRef idx="0">
+            <a:schemeClr val="accent1"/>
+          </a:effectRef>
+          <a:fontRef idx="minor">
+            <a:schemeClr val="tx1"/>
+          </a:fontRef>
+        </p:style>
+      </p:cxnSp>
+      <p:sp>
+        <p:nvSpPr>
+          <p:cNvPr id="50" name="TextBox 49">
+            <a:extLst>
+              <a:ext uri="{FF2B5EF4-FFF2-40B4-BE49-F238E27FC236}">
+                <a16:creationId xmlns:a16="http://schemas.microsoft.com/office/drawing/2014/main" id="{800045FC-3C53-4C2A-95C3-B0112A34EEFE}"/>
+              </a:ext>
+            </a:extLst>
+          </p:cNvPr>
+          <p:cNvSpPr txBox="1"/>
+          <p:nvPr/>
+        </p:nvSpPr>
+        <p:spPr>
+          <a:xfrm>
+            <a:off x="5867400" y="2679005"/>
+            <a:ext cx="2438400" cy="161583"/>
+          </a:xfrm>
+          <a:prstGeom prst="rect">
+            <a:avLst/>
+          </a:prstGeom>
+          <a:noFill/>
+        </p:spPr>
+        <p:txBody>
+          <a:bodyPr wrap="square" lIns="0" tIns="0" rIns="0" bIns="0" rtlCol="0">
+            <a:spAutoFit/>
+          </a:bodyPr>
+          <a:lstStyle/>
+          <a:p>
+            <a:r>
+              <a:rPr lang="en-US" sz="1050" dirty="0">
+                <a:solidFill>
+                  <a:schemeClr val="accent5">
+                    <a:lumMod val="75000"/>
+                  </a:schemeClr>
+                </a:solidFill>
+              </a:rPr>
+              <a:t>post(</a:t>
+            </a:r>
+            <a:r>
+              <a:rPr lang="en-SG" sz="1050" dirty="0" err="1">
+                <a:solidFill>
+                  <a:schemeClr val="accent5">
+                    <a:lumMod val="75000"/>
+                  </a:schemeClr>
+                </a:solidFill>
+              </a:rPr>
+              <a:t>UserTabChangedEvent</a:t>
+            </a:r>
+            <a:r>
+              <a:rPr lang="en-US" sz="1050" dirty="0">
+                <a:solidFill>
+                  <a:schemeClr val="accent5">
+                    <a:lumMod val="75000"/>
+                  </a:schemeClr>
+                </a:solidFill>
+              </a:rPr>
+              <a:t>)</a:t>
+            </a:r>
+          </a:p>
+        </p:txBody>
+      </p:sp>
     </p:spTree>
     <p:extLst>
       <p:ext uri="{BB962C8B-B14F-4D97-AF65-F5344CB8AC3E}">
         <p14:creationId xmlns:p14="http://schemas.microsoft.com/office/powerpoint/2010/main" val="4023378879"/>
+      </p:ext>
+    </p:extLst>
+  </p:cSld>
+  <p:clrMapOvr>
+    <a:masterClrMapping/>
+  </p:clrMapOvr>
+</p:sld>
+</file>
+
+<file path=ppt/slides/slide2.xml><?xml version="1.0" encoding="utf-8"?>
+<p:sld xmlns:a="http://schemas.openxmlformats.org/drawingml/2006/main" xmlns:r="http://schemas.openxmlformats.org/officeDocument/2006/relationships" xmlns:p="http://schemas.openxmlformats.org/presentationml/2006/main">
+  <p:cSld>
+    <p:spTree>
+      <p:nvGrpSpPr>
+        <p:cNvPr id="1" name=""/>
+        <p:cNvGrpSpPr/>
+        <p:nvPr/>
+      </p:nvGrpSpPr>
+      <p:grpSpPr>
+        <a:xfrm>
+          <a:off x="0" y="0"/>
+          <a:ext cx="0" cy="0"/>
+          <a:chOff x="0" y="0"/>
+          <a:chExt cx="0" cy="0"/>
+        </a:xfrm>
+      </p:grpSpPr>
+      <p:cxnSp>
+        <p:nvCxnSpPr>
+          <p:cNvPr id="48" name="Straight Arrow Connector 47">
+            <a:extLst>
+              <a:ext uri="{FF2B5EF4-FFF2-40B4-BE49-F238E27FC236}">
+                <a16:creationId xmlns:a16="http://schemas.microsoft.com/office/drawing/2014/main" id="{33609BD2-5B95-4AD1-9B0E-8CA8365CAF98}"/>
+              </a:ext>
+            </a:extLst>
+          </p:cNvPr>
+          <p:cNvCxnSpPr>
+            <a:cxnSpLocks/>
+          </p:cNvCxnSpPr>
+          <p:nvPr/>
+        </p:nvCxnSpPr>
+        <p:spPr>
+          <a:xfrm flipH="1" flipV="1">
+            <a:off x="3113202" y="2907712"/>
+            <a:ext cx="2616709" cy="5279"/>
+          </a:xfrm>
+          <a:prstGeom prst="straightConnector1">
+            <a:avLst/>
+          </a:prstGeom>
+          <a:ln w="19050">
+            <a:solidFill>
+              <a:srgbClr val="00B050"/>
+            </a:solidFill>
+            <a:tailEnd type="arrow"/>
+          </a:ln>
+        </p:spPr>
+        <p:style>
+          <a:lnRef idx="1">
+            <a:schemeClr val="accent1"/>
+          </a:lnRef>
+          <a:fillRef idx="0">
+            <a:schemeClr val="accent1"/>
+          </a:fillRef>
+          <a:effectRef idx="0">
+            <a:schemeClr val="accent1"/>
+          </a:effectRef>
+          <a:fontRef idx="minor">
+            <a:schemeClr val="tx1"/>
+          </a:fontRef>
+        </p:style>
+      </p:cxnSp>
+      <p:cxnSp>
+        <p:nvCxnSpPr>
+          <p:cNvPr id="34" name="Straight Arrow Connector 33">
+            <a:extLst>
+              <a:ext uri="{FF2B5EF4-FFF2-40B4-BE49-F238E27FC236}">
+                <a16:creationId xmlns:a16="http://schemas.microsoft.com/office/drawing/2014/main" id="{250F9B1F-DBD2-4ACF-8822-54AB40E0495B}"/>
+              </a:ext>
+            </a:extLst>
+          </p:cNvPr>
+          <p:cNvCxnSpPr>
+            <a:cxnSpLocks/>
+          </p:cNvCxnSpPr>
+          <p:nvPr/>
+        </p:nvCxnSpPr>
+        <p:spPr>
+          <a:xfrm flipH="1" flipV="1">
+            <a:off x="3111246" y="2145495"/>
+            <a:ext cx="2616709" cy="5279"/>
+          </a:xfrm>
+          <a:prstGeom prst="straightConnector1">
+            <a:avLst/>
+          </a:prstGeom>
+          <a:ln w="19050">
+            <a:solidFill>
+              <a:srgbClr val="00B050"/>
+            </a:solidFill>
+            <a:tailEnd type="arrow"/>
+          </a:ln>
+        </p:spPr>
+        <p:style>
+          <a:lnRef idx="1">
+            <a:schemeClr val="accent1"/>
+          </a:lnRef>
+          <a:fillRef idx="0">
+            <a:schemeClr val="accent1"/>
+          </a:fillRef>
+          <a:effectRef idx="0">
+            <a:schemeClr val="accent1"/>
+          </a:effectRef>
+          <a:fontRef idx="minor">
+            <a:schemeClr val="tx1"/>
+          </a:fontRef>
+        </p:style>
+      </p:cxnSp>
+      <p:sp>
+        <p:nvSpPr>
+          <p:cNvPr id="2" name="Rectangle 62">
+            <a:extLst>
+              <a:ext uri="{FF2B5EF4-FFF2-40B4-BE49-F238E27FC236}">
+                <a16:creationId xmlns:a16="http://schemas.microsoft.com/office/drawing/2014/main" id="{A6BD4BA5-1CA7-4E6D-9230-4EC32DA750D0}"/>
+              </a:ext>
+            </a:extLst>
+          </p:cNvPr>
+          <p:cNvSpPr/>
+          <p:nvPr/>
+        </p:nvSpPr>
+        <p:spPr>
+          <a:xfrm>
+            <a:off x="2487765" y="607926"/>
+            <a:ext cx="1093635" cy="346760"/>
+          </a:xfrm>
+          <a:prstGeom prst="rect">
+            <a:avLst/>
+          </a:prstGeom>
+          <a:solidFill>
+            <a:srgbClr val="00B050"/>
+          </a:solidFill>
+          <a:ln w="19050">
+            <a:solidFill>
+              <a:srgbClr val="00B050"/>
+            </a:solidFill>
+          </a:ln>
+          <a:effectLst/>
+        </p:spPr>
+        <p:style>
+          <a:lnRef idx="1">
+            <a:schemeClr val="accent2"/>
+          </a:lnRef>
+          <a:fillRef idx="2">
+            <a:schemeClr val="accent2"/>
+          </a:fillRef>
+          <a:effectRef idx="1">
+            <a:schemeClr val="accent2"/>
+          </a:effectRef>
+          <a:fontRef idx="minor">
+            <a:schemeClr val="dk1"/>
+          </a:fontRef>
+        </p:style>
+        <p:txBody>
+          <a:bodyPr rtlCol="0" anchor="ctr"/>
+          <a:lstStyle/>
+          <a:p>
+            <a:pPr algn="ctr"/>
+            <a:r>
+              <a:rPr lang="en-US" sz="1600" dirty="0">
+                <a:solidFill>
+                  <a:schemeClr val="bg1"/>
+                </a:solidFill>
+              </a:rPr>
+              <a:t>:UI</a:t>
+            </a:r>
+            <a:endParaRPr lang="en-SG" sz="1600" dirty="0">
+              <a:solidFill>
+                <a:schemeClr val="bg1"/>
+              </a:solidFill>
+            </a:endParaRPr>
+          </a:p>
+        </p:txBody>
+      </p:sp>
+      <p:cxnSp>
+        <p:nvCxnSpPr>
+          <p:cNvPr id="3" name="Straight Connector 2">
+            <a:extLst>
+              <a:ext uri="{FF2B5EF4-FFF2-40B4-BE49-F238E27FC236}">
+                <a16:creationId xmlns:a16="http://schemas.microsoft.com/office/drawing/2014/main" id="{D313CE53-E56D-4122-88E2-0F17EB619329}"/>
+              </a:ext>
+            </a:extLst>
+          </p:cNvPr>
+          <p:cNvCxnSpPr/>
+          <p:nvPr/>
+        </p:nvCxnSpPr>
+        <p:spPr>
+          <a:xfrm>
+            <a:off x="3034581" y="940924"/>
+            <a:ext cx="0" cy="2775004"/>
+          </a:xfrm>
+          <a:prstGeom prst="line">
+            <a:avLst/>
+          </a:prstGeom>
+          <a:ln w="19050">
+            <a:solidFill>
+              <a:srgbClr val="00B050"/>
+            </a:solidFill>
+            <a:prstDash val="sysDash"/>
+          </a:ln>
+          <a:effectLst/>
+        </p:spPr>
+        <p:style>
+          <a:lnRef idx="1">
+            <a:schemeClr val="accent1"/>
+          </a:lnRef>
+          <a:fillRef idx="2">
+            <a:schemeClr val="accent1"/>
+          </a:fillRef>
+          <a:effectRef idx="1">
+            <a:schemeClr val="accent1"/>
+          </a:effectRef>
+          <a:fontRef idx="minor">
+            <a:schemeClr val="dk1"/>
+          </a:fontRef>
+        </p:style>
+      </p:cxnSp>
+      <p:sp>
+        <p:nvSpPr>
+          <p:cNvPr id="5" name="Rectangle 62">
+            <a:extLst>
+              <a:ext uri="{FF2B5EF4-FFF2-40B4-BE49-F238E27FC236}">
+                <a16:creationId xmlns:a16="http://schemas.microsoft.com/office/drawing/2014/main" id="{CE3BA3ED-E3E3-4D5C-98CB-31F6AF10A962}"/>
+              </a:ext>
+            </a:extLst>
+          </p:cNvPr>
+          <p:cNvSpPr/>
+          <p:nvPr/>
+        </p:nvSpPr>
+        <p:spPr>
+          <a:xfrm>
+            <a:off x="5076723" y="637490"/>
+            <a:ext cx="1371600" cy="346760"/>
+          </a:xfrm>
+          <a:prstGeom prst="rect">
+            <a:avLst/>
+          </a:prstGeom>
+          <a:solidFill>
+            <a:schemeClr val="accent5">
+              <a:lumMod val="75000"/>
+            </a:schemeClr>
+          </a:solidFill>
+          <a:ln w="19050">
+            <a:solidFill>
+              <a:schemeClr val="accent5">
+                <a:lumMod val="75000"/>
+              </a:schemeClr>
+            </a:solidFill>
+          </a:ln>
+          <a:effectLst/>
+        </p:spPr>
+        <p:style>
+          <a:lnRef idx="1">
+            <a:schemeClr val="accent2"/>
+          </a:lnRef>
+          <a:fillRef idx="2">
+            <a:schemeClr val="accent2"/>
+          </a:fillRef>
+          <a:effectRef idx="1">
+            <a:schemeClr val="accent2"/>
+          </a:effectRef>
+          <a:fontRef idx="minor">
+            <a:schemeClr val="dk1"/>
+          </a:fontRef>
+        </p:style>
+        <p:txBody>
+          <a:bodyPr rtlCol="0" anchor="ctr"/>
+          <a:lstStyle/>
+          <a:p>
+            <a:pPr algn="ctr"/>
+            <a:r>
+              <a:rPr lang="en-US" sz="1600" dirty="0">
+                <a:solidFill>
+                  <a:schemeClr val="bg1"/>
+                </a:solidFill>
+              </a:rPr>
+              <a:t>:</a:t>
+            </a:r>
+            <a:r>
+              <a:rPr lang="en-US" sz="1600" dirty="0" err="1">
+                <a:solidFill>
+                  <a:schemeClr val="bg1"/>
+                </a:solidFill>
+              </a:rPr>
+              <a:t>EventsCenter</a:t>
+            </a:r>
+            <a:endParaRPr lang="en-SG" sz="1600" dirty="0">
+              <a:solidFill>
+                <a:schemeClr val="bg1"/>
+              </a:solidFill>
+            </a:endParaRPr>
+          </a:p>
+        </p:txBody>
+      </p:sp>
+      <p:cxnSp>
+        <p:nvCxnSpPr>
+          <p:cNvPr id="6" name="Straight Connector 5">
+            <a:extLst>
+              <a:ext uri="{FF2B5EF4-FFF2-40B4-BE49-F238E27FC236}">
+                <a16:creationId xmlns:a16="http://schemas.microsoft.com/office/drawing/2014/main" id="{169C0693-2F39-4B88-9D0D-CEE3EE68E04F}"/>
+              </a:ext>
+            </a:extLst>
+          </p:cNvPr>
+          <p:cNvCxnSpPr/>
+          <p:nvPr/>
+        </p:nvCxnSpPr>
+        <p:spPr>
+          <a:xfrm>
+            <a:off x="5789933" y="1011010"/>
+            <a:ext cx="0" cy="2550673"/>
+          </a:xfrm>
+          <a:prstGeom prst="line">
+            <a:avLst/>
+          </a:prstGeom>
+          <a:ln w="19050">
+            <a:solidFill>
+              <a:schemeClr val="accent5">
+                <a:lumMod val="75000"/>
+              </a:schemeClr>
+            </a:solidFill>
+            <a:prstDash val="sysDash"/>
+          </a:ln>
+          <a:effectLst/>
+        </p:spPr>
+        <p:style>
+          <a:lnRef idx="1">
+            <a:schemeClr val="accent1"/>
+          </a:lnRef>
+          <a:fillRef idx="2">
+            <a:schemeClr val="accent1"/>
+          </a:fillRef>
+          <a:effectRef idx="1">
+            <a:schemeClr val="accent1"/>
+          </a:effectRef>
+          <a:fontRef idx="minor">
+            <a:schemeClr val="dk1"/>
+          </a:fontRef>
+        </p:style>
+      </p:cxnSp>
+      <p:sp>
+        <p:nvSpPr>
+          <p:cNvPr id="7" name="Rectangle 6">
+            <a:extLst>
+              <a:ext uri="{FF2B5EF4-FFF2-40B4-BE49-F238E27FC236}">
+                <a16:creationId xmlns:a16="http://schemas.microsoft.com/office/drawing/2014/main" id="{1BDC0160-F17B-432D-9C52-DA508FE9D092}"/>
+              </a:ext>
+            </a:extLst>
+          </p:cNvPr>
+          <p:cNvSpPr/>
+          <p:nvPr/>
+        </p:nvSpPr>
+        <p:spPr>
+          <a:xfrm>
+            <a:off x="5718930" y="1264668"/>
+            <a:ext cx="142006" cy="441298"/>
+          </a:xfrm>
+          <a:prstGeom prst="rect">
+            <a:avLst/>
+          </a:prstGeom>
+          <a:solidFill>
+            <a:schemeClr val="accent5">
+              <a:lumMod val="75000"/>
+            </a:schemeClr>
+          </a:solidFill>
+          <a:ln>
+            <a:solidFill>
+              <a:schemeClr val="accent5">
+                <a:lumMod val="75000"/>
+              </a:schemeClr>
+            </a:solidFill>
+          </a:ln>
+          <a:effectLst/>
+        </p:spPr>
+        <p:style>
+          <a:lnRef idx="1">
+            <a:schemeClr val="accent3"/>
+          </a:lnRef>
+          <a:fillRef idx="2">
+            <a:schemeClr val="accent3"/>
+          </a:fillRef>
+          <a:effectRef idx="1">
+            <a:schemeClr val="accent3"/>
+          </a:effectRef>
+          <a:fontRef idx="minor">
+            <a:schemeClr val="dk1"/>
+          </a:fontRef>
+        </p:style>
+        <p:txBody>
+          <a:bodyPr rtlCol="0" anchor="ctr"/>
+          <a:lstStyle/>
+          <a:p>
+            <a:pPr algn="ctr"/>
+            <a:endParaRPr lang="en-SG" sz="1400"/>
+          </a:p>
+        </p:txBody>
+      </p:sp>
+      <p:sp>
+        <p:nvSpPr>
+          <p:cNvPr id="8" name="Rectangle 62">
+            <a:extLst>
+              <a:ext uri="{FF2B5EF4-FFF2-40B4-BE49-F238E27FC236}">
+                <a16:creationId xmlns:a16="http://schemas.microsoft.com/office/drawing/2014/main" id="{45665E5E-E902-4E1F-8158-AC7E442A7C8C}"/>
+              </a:ext>
+            </a:extLst>
+          </p:cNvPr>
+          <p:cNvSpPr/>
+          <p:nvPr/>
+        </p:nvSpPr>
+        <p:spPr>
+          <a:xfrm>
+            <a:off x="7936729" y="607926"/>
+            <a:ext cx="1093635" cy="346760"/>
+          </a:xfrm>
+          <a:prstGeom prst="rect">
+            <a:avLst/>
+          </a:prstGeom>
+          <a:solidFill>
+            <a:schemeClr val="accent6">
+              <a:lumMod val="75000"/>
+            </a:schemeClr>
+          </a:solidFill>
+          <a:ln w="19050">
+            <a:solidFill>
+              <a:schemeClr val="accent6">
+                <a:lumMod val="75000"/>
+              </a:schemeClr>
+            </a:solidFill>
+          </a:ln>
+          <a:effectLst/>
+        </p:spPr>
+        <p:style>
+          <a:lnRef idx="1">
+            <a:schemeClr val="accent2"/>
+          </a:lnRef>
+          <a:fillRef idx="2">
+            <a:schemeClr val="accent2"/>
+          </a:fillRef>
+          <a:effectRef idx="1">
+            <a:schemeClr val="accent2"/>
+          </a:effectRef>
+          <a:fontRef idx="minor">
+            <a:schemeClr val="dk1"/>
+          </a:fontRef>
+        </p:style>
+        <p:txBody>
+          <a:bodyPr rtlCol="0" anchor="ctr"/>
+          <a:lstStyle/>
+          <a:p>
+            <a:pPr algn="ctr"/>
+            <a:r>
+              <a:rPr lang="en-US" sz="1600" dirty="0">
+                <a:solidFill>
+                  <a:schemeClr val="bg1"/>
+                </a:solidFill>
+              </a:rPr>
+              <a:t>:Storage</a:t>
+            </a:r>
+            <a:endParaRPr lang="en-SG" sz="1600" dirty="0">
+              <a:solidFill>
+                <a:schemeClr val="bg1"/>
+              </a:solidFill>
+            </a:endParaRPr>
+          </a:p>
+        </p:txBody>
+      </p:sp>
+      <p:cxnSp>
+        <p:nvCxnSpPr>
+          <p:cNvPr id="9" name="Straight Connector 8">
+            <a:extLst>
+              <a:ext uri="{FF2B5EF4-FFF2-40B4-BE49-F238E27FC236}">
+                <a16:creationId xmlns:a16="http://schemas.microsoft.com/office/drawing/2014/main" id="{C38E761F-CBE7-42C8-BB2F-A9CF0EA37949}"/>
+              </a:ext>
+            </a:extLst>
+          </p:cNvPr>
+          <p:cNvCxnSpPr>
+            <a:cxnSpLocks/>
+          </p:cNvCxnSpPr>
+          <p:nvPr/>
+        </p:nvCxnSpPr>
+        <p:spPr>
+          <a:xfrm flipH="1">
+            <a:off x="8483546" y="968476"/>
+            <a:ext cx="9770" cy="2661549"/>
+          </a:xfrm>
+          <a:prstGeom prst="line">
+            <a:avLst/>
+          </a:prstGeom>
+          <a:ln w="19050">
+            <a:solidFill>
+              <a:schemeClr val="accent6">
+                <a:lumMod val="75000"/>
+              </a:schemeClr>
+            </a:solidFill>
+            <a:prstDash val="sysDash"/>
+          </a:ln>
+          <a:effectLst/>
+        </p:spPr>
+        <p:style>
+          <a:lnRef idx="1">
+            <a:schemeClr val="accent1"/>
+          </a:lnRef>
+          <a:fillRef idx="2">
+            <a:schemeClr val="accent1"/>
+          </a:fillRef>
+          <a:effectRef idx="1">
+            <a:schemeClr val="accent1"/>
+          </a:effectRef>
+          <a:fontRef idx="minor">
+            <a:schemeClr val="dk1"/>
+          </a:fontRef>
+        </p:style>
+      </p:cxnSp>
+      <p:sp>
+        <p:nvSpPr>
+          <p:cNvPr id="11" name="Rectangle 10">
+            <a:extLst>
+              <a:ext uri="{FF2B5EF4-FFF2-40B4-BE49-F238E27FC236}">
+                <a16:creationId xmlns:a16="http://schemas.microsoft.com/office/drawing/2014/main" id="{567F5A77-B635-4C12-BD9C-B19210A6C1CA}"/>
+              </a:ext>
+            </a:extLst>
+          </p:cNvPr>
+          <p:cNvSpPr/>
+          <p:nvPr/>
+        </p:nvSpPr>
+        <p:spPr>
+          <a:xfrm>
+            <a:off x="8430629" y="1367479"/>
+            <a:ext cx="124478" cy="287409"/>
+          </a:xfrm>
+          <a:prstGeom prst="rect">
+            <a:avLst/>
+          </a:prstGeom>
+          <a:solidFill>
+            <a:schemeClr val="accent6">
+              <a:lumMod val="75000"/>
+            </a:schemeClr>
+          </a:solidFill>
+          <a:ln>
+            <a:solidFill>
+              <a:schemeClr val="accent6">
+                <a:lumMod val="75000"/>
+              </a:schemeClr>
+            </a:solidFill>
+          </a:ln>
+          <a:effectLst/>
+        </p:spPr>
+        <p:style>
+          <a:lnRef idx="1">
+            <a:schemeClr val="accent3"/>
+          </a:lnRef>
+          <a:fillRef idx="2">
+            <a:schemeClr val="accent3"/>
+          </a:fillRef>
+          <a:effectRef idx="1">
+            <a:schemeClr val="accent3"/>
+          </a:effectRef>
+          <a:fontRef idx="minor">
+            <a:schemeClr val="dk1"/>
+          </a:fontRef>
+        </p:style>
+        <p:txBody>
+          <a:bodyPr rtlCol="0" anchor="ctr"/>
+          <a:lstStyle/>
+          <a:p>
+            <a:pPr algn="ctr"/>
+            <a:endParaRPr lang="en-SG" sz="1400"/>
+          </a:p>
+        </p:txBody>
+      </p:sp>
+      <p:grpSp>
+        <p:nvGrpSpPr>
+          <p:cNvPr id="12" name="Group 11">
+            <a:extLst>
+              <a:ext uri="{FF2B5EF4-FFF2-40B4-BE49-F238E27FC236}">
+                <a16:creationId xmlns:a16="http://schemas.microsoft.com/office/drawing/2014/main" id="{AB589E83-26F8-4814-93C3-CE5D78A73BA4}"/>
+              </a:ext>
+            </a:extLst>
+          </p:cNvPr>
+          <p:cNvGrpSpPr/>
+          <p:nvPr/>
+        </p:nvGrpSpPr>
+        <p:grpSpPr>
+          <a:xfrm flipH="1">
+            <a:off x="8522485" y="1367478"/>
+            <a:ext cx="217349" cy="270072"/>
+            <a:chOff x="1028134" y="5612032"/>
+            <a:chExt cx="217349" cy="270072"/>
+          </a:xfrm>
+        </p:grpSpPr>
+        <p:sp>
+          <p:nvSpPr>
+            <p:cNvPr id="13" name="Freeform 53">
+              <a:extLst>
+                <a:ext uri="{FF2B5EF4-FFF2-40B4-BE49-F238E27FC236}">
+                  <a16:creationId xmlns:a16="http://schemas.microsoft.com/office/drawing/2014/main" id="{49F57A16-44D5-44E8-B34F-30CEF07E1D49}"/>
+                </a:ext>
+              </a:extLst>
+            </p:cNvPr>
+            <p:cNvSpPr/>
+            <p:nvPr/>
+          </p:nvSpPr>
+          <p:spPr>
+            <a:xfrm rot="2600998" flipH="1" flipV="1">
+              <a:off x="1028134" y="5612032"/>
+              <a:ext cx="167452" cy="116880"/>
+            </a:xfrm>
+            <a:custGeom>
+              <a:avLst/>
+              <a:gdLst>
+                <a:gd name="connsiteX0" fmla="*/ 0 w 226400"/>
+                <a:gd name="connsiteY0" fmla="*/ 32920 h 171466"/>
+                <a:gd name="connsiteX1" fmla="*/ 157018 w 226400"/>
+                <a:gd name="connsiteY1" fmla="*/ 5211 h 171466"/>
+                <a:gd name="connsiteX2" fmla="*/ 221673 w 226400"/>
+                <a:gd name="connsiteY2" fmla="*/ 125284 h 171466"/>
+                <a:gd name="connsiteX3" fmla="*/ 36945 w 226400"/>
+                <a:gd name="connsiteY3" fmla="*/ 171466 h 171466"/>
+              </a:gdLst>
+              <a:ahLst/>
+              <a:cxnLst>
+                <a:cxn ang="0">
+                  <a:pos x="connsiteX0" y="connsiteY0"/>
+                </a:cxn>
+                <a:cxn ang="0">
+                  <a:pos x="connsiteX1" y="connsiteY1"/>
+                </a:cxn>
+                <a:cxn ang="0">
+                  <a:pos x="connsiteX2" y="connsiteY2"/>
+                </a:cxn>
+                <a:cxn ang="0">
+                  <a:pos x="connsiteX3" y="connsiteY3"/>
+                </a:cxn>
+              </a:cxnLst>
+              <a:rect l="l" t="t" r="r" b="b"/>
+              <a:pathLst>
+                <a:path w="226400" h="171466">
+                  <a:moveTo>
+                    <a:pt x="0" y="32920"/>
+                  </a:moveTo>
+                  <a:cubicBezTo>
+                    <a:pt x="60036" y="11368"/>
+                    <a:pt x="120073" y="-10183"/>
+                    <a:pt x="157018" y="5211"/>
+                  </a:cubicBezTo>
+                  <a:cubicBezTo>
+                    <a:pt x="193963" y="20605"/>
+                    <a:pt x="241685" y="97575"/>
+                    <a:pt x="221673" y="125284"/>
+                  </a:cubicBezTo>
+                  <a:cubicBezTo>
+                    <a:pt x="201661" y="152993"/>
+                    <a:pt x="119303" y="162229"/>
+                    <a:pt x="36945" y="171466"/>
+                  </a:cubicBezTo>
+                </a:path>
+              </a:pathLst>
+            </a:custGeom>
+            <a:ln w="19050">
+              <a:solidFill>
+                <a:schemeClr val="accent6">
+                  <a:lumMod val="75000"/>
+                </a:schemeClr>
+              </a:solidFill>
+              <a:headEnd type="arrow" w="med" len="med"/>
+              <a:tailEnd type="none" w="med" len="med"/>
+            </a:ln>
+          </p:spPr>
+          <p:style>
+            <a:lnRef idx="1">
+              <a:schemeClr val="accent1"/>
+            </a:lnRef>
+            <a:fillRef idx="0">
+              <a:schemeClr val="accent1"/>
+            </a:fillRef>
+            <a:effectRef idx="0">
+              <a:schemeClr val="accent1"/>
+            </a:effectRef>
+            <a:fontRef idx="minor">
+              <a:schemeClr val="tx1"/>
+            </a:fontRef>
+          </p:style>
+          <p:txBody>
+            <a:bodyPr rtlCol="0" anchor="ctr"/>
+            <a:lstStyle/>
+            <a:p>
+              <a:pPr algn="ctr"/>
+              <a:endParaRPr lang="en-SG"/>
+            </a:p>
+          </p:txBody>
+        </p:sp>
+        <p:sp>
+          <p:nvSpPr>
+            <p:cNvPr id="14" name="Rectangle 13">
+              <a:extLst>
+                <a:ext uri="{FF2B5EF4-FFF2-40B4-BE49-F238E27FC236}">
+                  <a16:creationId xmlns:a16="http://schemas.microsoft.com/office/drawing/2014/main" id="{BAB170F4-E1FB-4711-9BBF-9404E6BBD47C}"/>
+                </a:ext>
+              </a:extLst>
+            </p:cNvPr>
+            <p:cNvSpPr/>
+            <p:nvPr/>
+          </p:nvSpPr>
+          <p:spPr>
+            <a:xfrm>
+              <a:off x="1147403" y="5712513"/>
+              <a:ext cx="98080" cy="169591"/>
+            </a:xfrm>
+            <a:prstGeom prst="rect">
+              <a:avLst/>
+            </a:prstGeom>
+            <a:solidFill>
+              <a:schemeClr val="accent6">
+                <a:lumMod val="75000"/>
+              </a:schemeClr>
+            </a:solidFill>
+            <a:ln>
+              <a:solidFill>
+                <a:schemeClr val="bg1"/>
+              </a:solidFill>
+            </a:ln>
+            <a:effectLst/>
+          </p:spPr>
+          <p:style>
+            <a:lnRef idx="1">
+              <a:schemeClr val="accent3"/>
+            </a:lnRef>
+            <a:fillRef idx="2">
+              <a:schemeClr val="accent3"/>
+            </a:fillRef>
+            <a:effectRef idx="1">
+              <a:schemeClr val="accent3"/>
+            </a:effectRef>
+            <a:fontRef idx="minor">
+              <a:schemeClr val="dk1"/>
+            </a:fontRef>
+          </p:style>
+          <p:txBody>
+            <a:bodyPr rtlCol="0" anchor="ctr"/>
+            <a:lstStyle/>
+            <a:p>
+              <a:pPr algn="ctr"/>
+              <a:endParaRPr lang="en-SG" sz="1400"/>
+            </a:p>
+          </p:txBody>
+        </p:sp>
+      </p:grpSp>
+      <p:sp>
+        <p:nvSpPr>
+          <p:cNvPr id="15" name="TextBox 14">
+            <a:extLst>
+              <a:ext uri="{FF2B5EF4-FFF2-40B4-BE49-F238E27FC236}">
+                <a16:creationId xmlns:a16="http://schemas.microsoft.com/office/drawing/2014/main" id="{9D4EE3CE-1E36-4E9A-807E-6E51C51881CF}"/>
+              </a:ext>
+            </a:extLst>
+          </p:cNvPr>
+          <p:cNvSpPr txBox="1"/>
+          <p:nvPr/>
+        </p:nvSpPr>
+        <p:spPr>
+          <a:xfrm>
+            <a:off x="8803963" y="1107515"/>
+            <a:ext cx="539047" cy="323165"/>
+          </a:xfrm>
+          <a:prstGeom prst="rect">
+            <a:avLst/>
+          </a:prstGeom>
+          <a:noFill/>
+        </p:spPr>
+        <p:txBody>
+          <a:bodyPr wrap="square" lIns="0" tIns="0" rIns="0" bIns="0" rtlCol="0">
+            <a:spAutoFit/>
+          </a:bodyPr>
+          <a:lstStyle/>
+          <a:p>
+            <a:r>
+              <a:rPr lang="en-US" sz="1050" dirty="0">
+                <a:solidFill>
+                  <a:schemeClr val="accent6">
+                    <a:lumMod val="75000"/>
+                  </a:schemeClr>
+                </a:solidFill>
+              </a:rPr>
+              <a:t>Save </a:t>
+            </a:r>
+            <a:br>
+              <a:rPr lang="en-US" sz="1050" dirty="0">
+                <a:solidFill>
+                  <a:schemeClr val="accent6">
+                    <a:lumMod val="75000"/>
+                  </a:schemeClr>
+                </a:solidFill>
+              </a:rPr>
+            </a:br>
+            <a:r>
+              <a:rPr lang="en-US" sz="1050" dirty="0">
+                <a:solidFill>
+                  <a:schemeClr val="accent6">
+                    <a:lumMod val="75000"/>
+                  </a:schemeClr>
+                </a:solidFill>
+              </a:rPr>
+              <a:t>to file</a:t>
+            </a:r>
+          </a:p>
+        </p:txBody>
+      </p:sp>
+      <p:grpSp>
+        <p:nvGrpSpPr>
+          <p:cNvPr id="36" name="Group 35">
+            <a:extLst>
+              <a:ext uri="{FF2B5EF4-FFF2-40B4-BE49-F238E27FC236}">
+                <a16:creationId xmlns:a16="http://schemas.microsoft.com/office/drawing/2014/main" id="{C3F21FB4-14E0-41AA-984B-55FF672E2BD6}"/>
+              </a:ext>
+            </a:extLst>
+          </p:cNvPr>
+          <p:cNvGrpSpPr/>
+          <p:nvPr/>
+        </p:nvGrpSpPr>
+        <p:grpSpPr>
+          <a:xfrm>
+            <a:off x="1954352" y="1922037"/>
+            <a:ext cx="1142170" cy="514745"/>
+            <a:chOff x="1497152" y="2324488"/>
+            <a:chExt cx="1142170" cy="514745"/>
+          </a:xfrm>
+        </p:grpSpPr>
+        <p:sp>
+          <p:nvSpPr>
+            <p:cNvPr id="16" name="Rectangle 15">
+              <a:extLst>
+                <a:ext uri="{FF2B5EF4-FFF2-40B4-BE49-F238E27FC236}">
+                  <a16:creationId xmlns:a16="http://schemas.microsoft.com/office/drawing/2014/main" id="{F552B4D1-24F0-4C34-AA22-2DBEB0A898B3}"/>
+                </a:ext>
+              </a:extLst>
+            </p:cNvPr>
+            <p:cNvSpPr/>
+            <p:nvPr/>
+          </p:nvSpPr>
+          <p:spPr>
+            <a:xfrm>
+              <a:off x="2514844" y="2551824"/>
+              <a:ext cx="124478" cy="287409"/>
+            </a:xfrm>
+            <a:prstGeom prst="rect">
+              <a:avLst/>
+            </a:prstGeom>
+            <a:solidFill>
+              <a:srgbClr val="00B050"/>
+            </a:solidFill>
+            <a:ln>
+              <a:solidFill>
+                <a:srgbClr val="00B050"/>
+              </a:solidFill>
+            </a:ln>
+            <a:effectLst/>
+          </p:spPr>
+          <p:style>
+            <a:lnRef idx="1">
+              <a:schemeClr val="accent3"/>
+            </a:lnRef>
+            <a:fillRef idx="2">
+              <a:schemeClr val="accent3"/>
+            </a:fillRef>
+            <a:effectRef idx="1">
+              <a:schemeClr val="accent3"/>
+            </a:effectRef>
+            <a:fontRef idx="minor">
+              <a:schemeClr val="dk1"/>
+            </a:fontRef>
+          </p:style>
+          <p:txBody>
+            <a:bodyPr rtlCol="0" anchor="ctr"/>
+            <a:lstStyle/>
+            <a:p>
+              <a:pPr algn="ctr"/>
+              <a:endParaRPr lang="en-SG" sz="1400"/>
+            </a:p>
+          </p:txBody>
+        </p:sp>
+        <p:sp>
+          <p:nvSpPr>
+            <p:cNvPr id="18" name="Freeform 53">
+              <a:extLst>
+                <a:ext uri="{FF2B5EF4-FFF2-40B4-BE49-F238E27FC236}">
+                  <a16:creationId xmlns:a16="http://schemas.microsoft.com/office/drawing/2014/main" id="{BFFFAA99-C721-49B8-B2EB-DC8C4C2A0F3D}"/>
+                </a:ext>
+              </a:extLst>
+            </p:cNvPr>
+            <p:cNvSpPr/>
+            <p:nvPr/>
+          </p:nvSpPr>
+          <p:spPr>
+            <a:xfrm rot="2600998" flipH="1" flipV="1">
+              <a:off x="2342475" y="2489242"/>
+              <a:ext cx="167452" cy="116880"/>
+            </a:xfrm>
+            <a:custGeom>
+              <a:avLst/>
+              <a:gdLst>
+                <a:gd name="connsiteX0" fmla="*/ 0 w 226400"/>
+                <a:gd name="connsiteY0" fmla="*/ 32920 h 171466"/>
+                <a:gd name="connsiteX1" fmla="*/ 157018 w 226400"/>
+                <a:gd name="connsiteY1" fmla="*/ 5211 h 171466"/>
+                <a:gd name="connsiteX2" fmla="*/ 221673 w 226400"/>
+                <a:gd name="connsiteY2" fmla="*/ 125284 h 171466"/>
+                <a:gd name="connsiteX3" fmla="*/ 36945 w 226400"/>
+                <a:gd name="connsiteY3" fmla="*/ 171466 h 171466"/>
+              </a:gdLst>
+              <a:ahLst/>
+              <a:cxnLst>
+                <a:cxn ang="0">
+                  <a:pos x="connsiteX0" y="connsiteY0"/>
+                </a:cxn>
+                <a:cxn ang="0">
+                  <a:pos x="connsiteX1" y="connsiteY1"/>
+                </a:cxn>
+                <a:cxn ang="0">
+                  <a:pos x="connsiteX2" y="connsiteY2"/>
+                </a:cxn>
+                <a:cxn ang="0">
+                  <a:pos x="connsiteX3" y="connsiteY3"/>
+                </a:cxn>
+              </a:cxnLst>
+              <a:rect l="l" t="t" r="r" b="b"/>
+              <a:pathLst>
+                <a:path w="226400" h="171466">
+                  <a:moveTo>
+                    <a:pt x="0" y="32920"/>
+                  </a:moveTo>
+                  <a:cubicBezTo>
+                    <a:pt x="60036" y="11368"/>
+                    <a:pt x="120073" y="-10183"/>
+                    <a:pt x="157018" y="5211"/>
+                  </a:cubicBezTo>
+                  <a:cubicBezTo>
+                    <a:pt x="193963" y="20605"/>
+                    <a:pt x="241685" y="97575"/>
+                    <a:pt x="221673" y="125284"/>
+                  </a:cubicBezTo>
+                  <a:cubicBezTo>
+                    <a:pt x="201661" y="152993"/>
+                    <a:pt x="119303" y="162229"/>
+                    <a:pt x="36945" y="171466"/>
+                  </a:cubicBezTo>
+                </a:path>
+              </a:pathLst>
+            </a:custGeom>
+            <a:ln w="19050">
+              <a:solidFill>
+                <a:srgbClr val="00B050"/>
+              </a:solidFill>
+              <a:headEnd type="arrow" w="med" len="med"/>
+              <a:tailEnd type="none" w="med" len="med"/>
+            </a:ln>
+          </p:spPr>
+          <p:style>
+            <a:lnRef idx="1">
+              <a:schemeClr val="accent1"/>
+            </a:lnRef>
+            <a:fillRef idx="0">
+              <a:schemeClr val="accent1"/>
+            </a:fillRef>
+            <a:effectRef idx="0">
+              <a:schemeClr val="accent1"/>
+            </a:effectRef>
+            <a:fontRef idx="minor">
+              <a:schemeClr val="tx1"/>
+            </a:fontRef>
+          </p:style>
+          <p:txBody>
+            <a:bodyPr rtlCol="0" anchor="ctr"/>
+            <a:lstStyle/>
+            <a:p>
+              <a:pPr algn="ctr"/>
+              <a:endParaRPr lang="en-SG"/>
+            </a:p>
+          </p:txBody>
+        </p:sp>
+        <p:sp>
+          <p:nvSpPr>
+            <p:cNvPr id="19" name="Rectangle 18">
+              <a:extLst>
+                <a:ext uri="{FF2B5EF4-FFF2-40B4-BE49-F238E27FC236}">
+                  <a16:creationId xmlns:a16="http://schemas.microsoft.com/office/drawing/2014/main" id="{2788407E-F729-4AA8-B0F2-703157AEA0F0}"/>
+                </a:ext>
+              </a:extLst>
+            </p:cNvPr>
+            <p:cNvSpPr/>
+            <p:nvPr/>
+          </p:nvSpPr>
+          <p:spPr>
+            <a:xfrm flipH="1">
+              <a:off x="2464382" y="2635344"/>
+              <a:ext cx="98080" cy="169591"/>
+            </a:xfrm>
+            <a:prstGeom prst="rect">
+              <a:avLst/>
+            </a:prstGeom>
+            <a:solidFill>
+              <a:srgbClr val="00B050"/>
+            </a:solidFill>
+            <a:ln>
+              <a:solidFill>
+                <a:schemeClr val="bg1"/>
+              </a:solidFill>
+            </a:ln>
+            <a:effectLst/>
+          </p:spPr>
+          <p:style>
+            <a:lnRef idx="1">
+              <a:schemeClr val="accent3"/>
+            </a:lnRef>
+            <a:fillRef idx="2">
+              <a:schemeClr val="accent3"/>
+            </a:fillRef>
+            <a:effectRef idx="1">
+              <a:schemeClr val="accent3"/>
+            </a:effectRef>
+            <a:fontRef idx="minor">
+              <a:schemeClr val="dk1"/>
+            </a:fontRef>
+          </p:style>
+          <p:txBody>
+            <a:bodyPr rtlCol="0" anchor="ctr"/>
+            <a:lstStyle/>
+            <a:p>
+              <a:pPr algn="ctr"/>
+              <a:endParaRPr lang="en-SG" sz="1400"/>
+            </a:p>
+          </p:txBody>
+        </p:sp>
+        <p:sp>
+          <p:nvSpPr>
+            <p:cNvPr id="20" name="TextBox 19">
+              <a:extLst>
+                <a:ext uri="{FF2B5EF4-FFF2-40B4-BE49-F238E27FC236}">
+                  <a16:creationId xmlns:a16="http://schemas.microsoft.com/office/drawing/2014/main" id="{113633CB-75E4-4968-991A-DF9515F5117B}"/>
+                </a:ext>
+              </a:extLst>
+            </p:cNvPr>
+            <p:cNvSpPr txBox="1"/>
+            <p:nvPr/>
+          </p:nvSpPr>
+          <p:spPr>
+            <a:xfrm>
+              <a:off x="1497152" y="2324488"/>
+              <a:ext cx="796930" cy="323165"/>
+            </a:xfrm>
+            <a:prstGeom prst="rect">
+              <a:avLst/>
+            </a:prstGeom>
+            <a:noFill/>
+          </p:spPr>
+          <p:txBody>
+            <a:bodyPr wrap="square" lIns="0" tIns="0" rIns="0" bIns="0" rtlCol="0">
+              <a:spAutoFit/>
+            </a:bodyPr>
+            <a:lstStyle/>
+            <a:p>
+              <a:pPr algn="r"/>
+              <a:r>
+                <a:rPr lang="en-US" sz="1050" dirty="0">
+                  <a:solidFill>
+                    <a:srgbClr val="00B050"/>
+                  </a:solidFill>
+                </a:rPr>
+                <a:t>Updates</a:t>
+              </a:r>
+              <a:br>
+                <a:rPr lang="en-US" sz="1050" dirty="0">
+                  <a:solidFill>
+                    <a:srgbClr val="00B050"/>
+                  </a:solidFill>
+                </a:rPr>
+              </a:br>
+              <a:r>
+                <a:rPr lang="en-US" sz="1050" dirty="0" err="1">
+                  <a:solidFill>
+                    <a:srgbClr val="00B050"/>
+                  </a:solidFill>
+                </a:rPr>
+                <a:t>MainWindow</a:t>
+              </a:r>
+              <a:endParaRPr lang="en-US" sz="1050" dirty="0">
+                <a:solidFill>
+                  <a:srgbClr val="00B050"/>
+                </a:solidFill>
+              </a:endParaRPr>
+            </a:p>
+          </p:txBody>
+        </p:sp>
+      </p:grpSp>
+      <p:grpSp>
+        <p:nvGrpSpPr>
+          <p:cNvPr id="39" name="Group 38">
+            <a:extLst>
+              <a:ext uri="{FF2B5EF4-FFF2-40B4-BE49-F238E27FC236}">
+                <a16:creationId xmlns:a16="http://schemas.microsoft.com/office/drawing/2014/main" id="{DEF8C54F-51BD-433D-BBBB-32047580AB09}"/>
+              </a:ext>
+            </a:extLst>
+          </p:cNvPr>
+          <p:cNvGrpSpPr/>
+          <p:nvPr/>
+        </p:nvGrpSpPr>
+        <p:grpSpPr>
+          <a:xfrm>
+            <a:off x="1953299" y="2685655"/>
+            <a:ext cx="1142170" cy="514745"/>
+            <a:chOff x="-40370" y="2761854"/>
+            <a:chExt cx="1142170" cy="514745"/>
+          </a:xfrm>
+        </p:grpSpPr>
+        <p:sp>
+          <p:nvSpPr>
+            <p:cNvPr id="21" name="Rectangle 20">
+              <a:extLst>
+                <a:ext uri="{FF2B5EF4-FFF2-40B4-BE49-F238E27FC236}">
+                  <a16:creationId xmlns:a16="http://schemas.microsoft.com/office/drawing/2014/main" id="{AB1AC14A-C500-4CE6-979B-F34881D7ED80}"/>
+                </a:ext>
+              </a:extLst>
+            </p:cNvPr>
+            <p:cNvSpPr/>
+            <p:nvPr/>
+          </p:nvSpPr>
+          <p:spPr>
+            <a:xfrm>
+              <a:off x="977322" y="2989190"/>
+              <a:ext cx="124478" cy="287409"/>
+            </a:xfrm>
+            <a:prstGeom prst="rect">
+              <a:avLst/>
+            </a:prstGeom>
+            <a:solidFill>
+              <a:srgbClr val="00B050"/>
+            </a:solidFill>
+            <a:ln>
+              <a:solidFill>
+                <a:srgbClr val="00B050"/>
+              </a:solidFill>
+            </a:ln>
+            <a:effectLst/>
+          </p:spPr>
+          <p:style>
+            <a:lnRef idx="1">
+              <a:schemeClr val="accent3"/>
+            </a:lnRef>
+            <a:fillRef idx="2">
+              <a:schemeClr val="accent3"/>
+            </a:fillRef>
+            <a:effectRef idx="1">
+              <a:schemeClr val="accent3"/>
+            </a:effectRef>
+            <a:fontRef idx="minor">
+              <a:schemeClr val="dk1"/>
+            </a:fontRef>
+          </p:style>
+          <p:txBody>
+            <a:bodyPr rtlCol="0" anchor="ctr"/>
+            <a:lstStyle/>
+            <a:p>
+              <a:pPr algn="ctr"/>
+              <a:endParaRPr lang="en-SG" sz="1400"/>
+            </a:p>
+          </p:txBody>
+        </p:sp>
+        <p:sp>
+          <p:nvSpPr>
+            <p:cNvPr id="22" name="Freeform 53">
+              <a:extLst>
+                <a:ext uri="{FF2B5EF4-FFF2-40B4-BE49-F238E27FC236}">
+                  <a16:creationId xmlns:a16="http://schemas.microsoft.com/office/drawing/2014/main" id="{6990AB1B-4561-40CB-BEEF-320E0D775097}"/>
+                </a:ext>
+              </a:extLst>
+            </p:cNvPr>
+            <p:cNvSpPr/>
+            <p:nvPr/>
+          </p:nvSpPr>
+          <p:spPr>
+            <a:xfrm rot="2600998" flipH="1" flipV="1">
+              <a:off x="804953" y="2926608"/>
+              <a:ext cx="167452" cy="116880"/>
+            </a:xfrm>
+            <a:custGeom>
+              <a:avLst/>
+              <a:gdLst>
+                <a:gd name="connsiteX0" fmla="*/ 0 w 226400"/>
+                <a:gd name="connsiteY0" fmla="*/ 32920 h 171466"/>
+                <a:gd name="connsiteX1" fmla="*/ 157018 w 226400"/>
+                <a:gd name="connsiteY1" fmla="*/ 5211 h 171466"/>
+                <a:gd name="connsiteX2" fmla="*/ 221673 w 226400"/>
+                <a:gd name="connsiteY2" fmla="*/ 125284 h 171466"/>
+                <a:gd name="connsiteX3" fmla="*/ 36945 w 226400"/>
+                <a:gd name="connsiteY3" fmla="*/ 171466 h 171466"/>
+              </a:gdLst>
+              <a:ahLst/>
+              <a:cxnLst>
+                <a:cxn ang="0">
+                  <a:pos x="connsiteX0" y="connsiteY0"/>
+                </a:cxn>
+                <a:cxn ang="0">
+                  <a:pos x="connsiteX1" y="connsiteY1"/>
+                </a:cxn>
+                <a:cxn ang="0">
+                  <a:pos x="connsiteX2" y="connsiteY2"/>
+                </a:cxn>
+                <a:cxn ang="0">
+                  <a:pos x="connsiteX3" y="connsiteY3"/>
+                </a:cxn>
+              </a:cxnLst>
+              <a:rect l="l" t="t" r="r" b="b"/>
+              <a:pathLst>
+                <a:path w="226400" h="171466">
+                  <a:moveTo>
+                    <a:pt x="0" y="32920"/>
+                  </a:moveTo>
+                  <a:cubicBezTo>
+                    <a:pt x="60036" y="11368"/>
+                    <a:pt x="120073" y="-10183"/>
+                    <a:pt x="157018" y="5211"/>
+                  </a:cubicBezTo>
+                  <a:cubicBezTo>
+                    <a:pt x="193963" y="20605"/>
+                    <a:pt x="241685" y="97575"/>
+                    <a:pt x="221673" y="125284"/>
+                  </a:cubicBezTo>
+                  <a:cubicBezTo>
+                    <a:pt x="201661" y="152993"/>
+                    <a:pt x="119303" y="162229"/>
+                    <a:pt x="36945" y="171466"/>
+                  </a:cubicBezTo>
+                </a:path>
+              </a:pathLst>
+            </a:custGeom>
+            <a:ln w="19050">
+              <a:solidFill>
+                <a:srgbClr val="00B050"/>
+              </a:solidFill>
+              <a:headEnd type="arrow" w="med" len="med"/>
+              <a:tailEnd type="none" w="med" len="med"/>
+            </a:ln>
+          </p:spPr>
+          <p:style>
+            <a:lnRef idx="1">
+              <a:schemeClr val="accent1"/>
+            </a:lnRef>
+            <a:fillRef idx="0">
+              <a:schemeClr val="accent1"/>
+            </a:fillRef>
+            <a:effectRef idx="0">
+              <a:schemeClr val="accent1"/>
+            </a:effectRef>
+            <a:fontRef idx="minor">
+              <a:schemeClr val="tx1"/>
+            </a:fontRef>
+          </p:style>
+          <p:txBody>
+            <a:bodyPr rtlCol="0" anchor="ctr"/>
+            <a:lstStyle/>
+            <a:p>
+              <a:pPr algn="ctr"/>
+              <a:endParaRPr lang="en-SG"/>
+            </a:p>
+          </p:txBody>
+        </p:sp>
+        <p:sp>
+          <p:nvSpPr>
+            <p:cNvPr id="23" name="Rectangle 22">
+              <a:extLst>
+                <a:ext uri="{FF2B5EF4-FFF2-40B4-BE49-F238E27FC236}">
+                  <a16:creationId xmlns:a16="http://schemas.microsoft.com/office/drawing/2014/main" id="{37FD0DAD-5EDD-45A1-B5E1-35438AE815FB}"/>
+                </a:ext>
+              </a:extLst>
+            </p:cNvPr>
+            <p:cNvSpPr/>
+            <p:nvPr/>
+          </p:nvSpPr>
+          <p:spPr>
+            <a:xfrm flipH="1">
+              <a:off x="926860" y="3072710"/>
+              <a:ext cx="98080" cy="169591"/>
+            </a:xfrm>
+            <a:prstGeom prst="rect">
+              <a:avLst/>
+            </a:prstGeom>
+            <a:solidFill>
+              <a:srgbClr val="00B050"/>
+            </a:solidFill>
+            <a:ln>
+              <a:solidFill>
+                <a:schemeClr val="bg1"/>
+              </a:solidFill>
+            </a:ln>
+            <a:effectLst/>
+          </p:spPr>
+          <p:style>
+            <a:lnRef idx="1">
+              <a:schemeClr val="accent3"/>
+            </a:lnRef>
+            <a:fillRef idx="2">
+              <a:schemeClr val="accent3"/>
+            </a:fillRef>
+            <a:effectRef idx="1">
+              <a:schemeClr val="accent3"/>
+            </a:effectRef>
+            <a:fontRef idx="minor">
+              <a:schemeClr val="dk1"/>
+            </a:fontRef>
+          </p:style>
+          <p:txBody>
+            <a:bodyPr rtlCol="0" anchor="ctr"/>
+            <a:lstStyle/>
+            <a:p>
+              <a:pPr algn="ctr"/>
+              <a:endParaRPr lang="en-SG" sz="1400"/>
+            </a:p>
+          </p:txBody>
+        </p:sp>
+        <p:sp>
+          <p:nvSpPr>
+            <p:cNvPr id="24" name="TextBox 23">
+              <a:extLst>
+                <a:ext uri="{FF2B5EF4-FFF2-40B4-BE49-F238E27FC236}">
+                  <a16:creationId xmlns:a16="http://schemas.microsoft.com/office/drawing/2014/main" id="{78012FE9-1E55-4FDA-91AF-F1F8897401D1}"/>
+                </a:ext>
+              </a:extLst>
+            </p:cNvPr>
+            <p:cNvSpPr txBox="1"/>
+            <p:nvPr/>
+          </p:nvSpPr>
+          <p:spPr>
+            <a:xfrm>
+              <a:off x="-40370" y="2761854"/>
+              <a:ext cx="796930" cy="323165"/>
+            </a:xfrm>
+            <a:prstGeom prst="rect">
+              <a:avLst/>
+            </a:prstGeom>
+            <a:noFill/>
+          </p:spPr>
+          <p:txBody>
+            <a:bodyPr wrap="square" lIns="0" tIns="0" rIns="0" bIns="0" rtlCol="0">
+              <a:spAutoFit/>
+            </a:bodyPr>
+            <a:lstStyle/>
+            <a:p>
+              <a:pPr algn="r"/>
+              <a:r>
+                <a:rPr lang="en-US" sz="1050" dirty="0">
+                  <a:solidFill>
+                    <a:srgbClr val="00B050"/>
+                  </a:solidFill>
+                </a:rPr>
+                <a:t>Updates</a:t>
+              </a:r>
+              <a:br>
+                <a:rPr lang="en-US" sz="1050" dirty="0">
+                  <a:solidFill>
+                    <a:srgbClr val="00B050"/>
+                  </a:solidFill>
+                </a:rPr>
+              </a:br>
+              <a:r>
+                <a:rPr lang="en-US" sz="1050" dirty="0" err="1">
+                  <a:solidFill>
+                    <a:srgbClr val="00B050"/>
+                  </a:solidFill>
+                </a:rPr>
+                <a:t>UserTab</a:t>
+              </a:r>
+              <a:endParaRPr lang="en-US" sz="1050" dirty="0">
+                <a:solidFill>
+                  <a:srgbClr val="00B050"/>
+                </a:solidFill>
+              </a:endParaRPr>
+            </a:p>
+          </p:txBody>
+        </p:sp>
+      </p:grpSp>
+      <p:sp>
+        <p:nvSpPr>
+          <p:cNvPr id="25" name="TextBox 24">
+            <a:extLst>
+              <a:ext uri="{FF2B5EF4-FFF2-40B4-BE49-F238E27FC236}">
+                <a16:creationId xmlns:a16="http://schemas.microsoft.com/office/drawing/2014/main" id="{CE6788DE-C2B5-43AA-8E7D-F8AD7A028F75}"/>
+              </a:ext>
+            </a:extLst>
+          </p:cNvPr>
+          <p:cNvSpPr txBox="1"/>
+          <p:nvPr/>
+        </p:nvSpPr>
+        <p:spPr>
+          <a:xfrm>
+            <a:off x="3629660" y="1066800"/>
+            <a:ext cx="2009134" cy="161583"/>
+          </a:xfrm>
+          <a:prstGeom prst="rect">
+            <a:avLst/>
+          </a:prstGeom>
+          <a:noFill/>
+        </p:spPr>
+        <p:txBody>
+          <a:bodyPr wrap="square" lIns="0" tIns="0" rIns="0" bIns="0" rtlCol="0">
+            <a:spAutoFit/>
+          </a:bodyPr>
+          <a:lstStyle/>
+          <a:p>
+            <a:r>
+              <a:rPr lang="en-US" sz="1050" dirty="0">
+                <a:solidFill>
+                  <a:schemeClr val="accent5">
+                    <a:lumMod val="75000"/>
+                  </a:schemeClr>
+                </a:solidFill>
+              </a:rPr>
+              <a:t>post(</a:t>
+            </a:r>
+            <a:r>
+              <a:rPr lang="en-SG" sz="1050" dirty="0" err="1">
+                <a:solidFill>
+                  <a:schemeClr val="accent5">
+                    <a:lumMod val="75000"/>
+                  </a:schemeClr>
+                </a:solidFill>
+              </a:rPr>
+              <a:t>CredentialStoreChangedEvent</a:t>
+            </a:r>
+            <a:r>
+              <a:rPr lang="en-US" sz="1050" dirty="0">
+                <a:solidFill>
+                  <a:schemeClr val="accent5">
+                    <a:lumMod val="75000"/>
+                  </a:schemeClr>
+                </a:solidFill>
+              </a:rPr>
+              <a:t>)</a:t>
+            </a:r>
+          </a:p>
+        </p:txBody>
+      </p:sp>
+      <p:cxnSp>
+        <p:nvCxnSpPr>
+          <p:cNvPr id="26" name="Straight Arrow Connector 25">
+            <a:extLst>
+              <a:ext uri="{FF2B5EF4-FFF2-40B4-BE49-F238E27FC236}">
+                <a16:creationId xmlns:a16="http://schemas.microsoft.com/office/drawing/2014/main" id="{54BD3C9D-7D5C-4795-BCC9-CE74A0B3182C}"/>
+              </a:ext>
+            </a:extLst>
+          </p:cNvPr>
+          <p:cNvCxnSpPr>
+            <a:cxnSpLocks/>
+          </p:cNvCxnSpPr>
+          <p:nvPr/>
+        </p:nvCxnSpPr>
+        <p:spPr>
+          <a:xfrm>
+            <a:off x="4191000" y="1268674"/>
+            <a:ext cx="1524699" cy="0"/>
+          </a:xfrm>
+          <a:prstGeom prst="straightConnector1">
+            <a:avLst/>
+          </a:prstGeom>
+          <a:ln w="19050">
+            <a:solidFill>
+              <a:srgbClr val="7030A0"/>
+            </a:solidFill>
+            <a:tailEnd type="arrow"/>
+          </a:ln>
+        </p:spPr>
+        <p:style>
+          <a:lnRef idx="1">
+            <a:schemeClr val="accent1"/>
+          </a:lnRef>
+          <a:fillRef idx="0">
+            <a:schemeClr val="accent1"/>
+          </a:fillRef>
+          <a:effectRef idx="0">
+            <a:schemeClr val="accent1"/>
+          </a:effectRef>
+          <a:fontRef idx="minor">
+            <a:schemeClr val="tx1"/>
+          </a:fontRef>
+        </p:style>
+      </p:cxnSp>
+      <p:cxnSp>
+        <p:nvCxnSpPr>
+          <p:cNvPr id="28" name="Straight Arrow Connector 27">
+            <a:extLst>
+              <a:ext uri="{FF2B5EF4-FFF2-40B4-BE49-F238E27FC236}">
+                <a16:creationId xmlns:a16="http://schemas.microsoft.com/office/drawing/2014/main" id="{7FA3F540-939C-47FF-9801-8A29AA2FBCD2}"/>
+              </a:ext>
+            </a:extLst>
+          </p:cNvPr>
+          <p:cNvCxnSpPr>
+            <a:cxnSpLocks/>
+          </p:cNvCxnSpPr>
+          <p:nvPr/>
+        </p:nvCxnSpPr>
+        <p:spPr>
+          <a:xfrm>
+            <a:off x="4144594" y="2011505"/>
+            <a:ext cx="1559022" cy="0"/>
+          </a:xfrm>
+          <a:prstGeom prst="straightConnector1">
+            <a:avLst/>
+          </a:prstGeom>
+          <a:ln w="19050">
+            <a:solidFill>
+              <a:srgbClr val="0070C0"/>
+            </a:solidFill>
+            <a:tailEnd type="arrow"/>
+          </a:ln>
+        </p:spPr>
+        <p:style>
+          <a:lnRef idx="1">
+            <a:schemeClr val="accent1"/>
+          </a:lnRef>
+          <a:fillRef idx="0">
+            <a:schemeClr val="accent1"/>
+          </a:fillRef>
+          <a:effectRef idx="0">
+            <a:schemeClr val="accent1"/>
+          </a:effectRef>
+          <a:fontRef idx="minor">
+            <a:schemeClr val="tx1"/>
+          </a:fontRef>
+        </p:style>
+      </p:cxnSp>
+      <p:sp>
+        <p:nvSpPr>
+          <p:cNvPr id="29" name="TextBox 28">
+            <a:extLst>
+              <a:ext uri="{FF2B5EF4-FFF2-40B4-BE49-F238E27FC236}">
+                <a16:creationId xmlns:a16="http://schemas.microsoft.com/office/drawing/2014/main" id="{178499C0-81DC-42FC-A0A2-8D5542013B6A}"/>
+              </a:ext>
+            </a:extLst>
+          </p:cNvPr>
+          <p:cNvSpPr txBox="1"/>
+          <p:nvPr/>
+        </p:nvSpPr>
+        <p:spPr>
+          <a:xfrm>
+            <a:off x="3200394" y="1841475"/>
+            <a:ext cx="2438400" cy="161583"/>
+          </a:xfrm>
+          <a:prstGeom prst="rect">
+            <a:avLst/>
+          </a:prstGeom>
+          <a:noFill/>
+        </p:spPr>
+        <p:txBody>
+          <a:bodyPr wrap="square" lIns="0" tIns="0" rIns="0" bIns="0" rtlCol="0">
+            <a:spAutoFit/>
+          </a:bodyPr>
+          <a:lstStyle/>
+          <a:p>
+            <a:pPr algn="r"/>
+            <a:r>
+              <a:rPr lang="en-US" sz="1050" dirty="0">
+                <a:solidFill>
+                  <a:schemeClr val="accent5">
+                    <a:lumMod val="75000"/>
+                  </a:schemeClr>
+                </a:solidFill>
+              </a:rPr>
+              <a:t>post(</a:t>
+            </a:r>
+            <a:r>
+              <a:rPr lang="en-SG" sz="1050" dirty="0" err="1">
+                <a:solidFill>
+                  <a:schemeClr val="accent5">
+                    <a:lumMod val="75000"/>
+                  </a:schemeClr>
+                </a:solidFill>
+              </a:rPr>
+              <a:t>MainWindowClearResourceEvent</a:t>
+            </a:r>
+            <a:r>
+              <a:rPr lang="en-US" sz="1050" dirty="0">
+                <a:solidFill>
+                  <a:schemeClr val="accent5">
+                    <a:lumMod val="75000"/>
+                  </a:schemeClr>
+                </a:solidFill>
+              </a:rPr>
+              <a:t>)</a:t>
+            </a:r>
+          </a:p>
+        </p:txBody>
+      </p:sp>
+      <p:cxnSp>
+        <p:nvCxnSpPr>
+          <p:cNvPr id="30" name="Straight Arrow Connector 29">
+            <a:extLst>
+              <a:ext uri="{FF2B5EF4-FFF2-40B4-BE49-F238E27FC236}">
+                <a16:creationId xmlns:a16="http://schemas.microsoft.com/office/drawing/2014/main" id="{10E38BA0-EE75-480C-94A7-08F7E0E2ACAB}"/>
+              </a:ext>
+            </a:extLst>
+          </p:cNvPr>
+          <p:cNvCxnSpPr>
+            <a:cxnSpLocks/>
+          </p:cNvCxnSpPr>
+          <p:nvPr/>
+        </p:nvCxnSpPr>
+        <p:spPr>
+          <a:xfrm>
+            <a:off x="4144594" y="2748534"/>
+            <a:ext cx="1563263" cy="0"/>
+          </a:xfrm>
+          <a:prstGeom prst="straightConnector1">
+            <a:avLst/>
+          </a:prstGeom>
+          <a:ln w="19050">
+            <a:solidFill>
+              <a:srgbClr val="0070C0"/>
+            </a:solidFill>
+            <a:tailEnd type="arrow"/>
+          </a:ln>
+        </p:spPr>
+        <p:style>
+          <a:lnRef idx="1">
+            <a:schemeClr val="accent1"/>
+          </a:lnRef>
+          <a:fillRef idx="0">
+            <a:schemeClr val="accent1"/>
+          </a:fillRef>
+          <a:effectRef idx="0">
+            <a:schemeClr val="accent1"/>
+          </a:effectRef>
+          <a:fontRef idx="minor">
+            <a:schemeClr val="tx1"/>
+          </a:fontRef>
+        </p:style>
+      </p:cxnSp>
+      <p:sp>
+        <p:nvSpPr>
+          <p:cNvPr id="31" name="TextBox 30">
+            <a:extLst>
+              <a:ext uri="{FF2B5EF4-FFF2-40B4-BE49-F238E27FC236}">
+                <a16:creationId xmlns:a16="http://schemas.microsoft.com/office/drawing/2014/main" id="{CAF6AD35-EEED-45DA-B488-A50B3FFEC62E}"/>
+              </a:ext>
+            </a:extLst>
+          </p:cNvPr>
+          <p:cNvSpPr txBox="1"/>
+          <p:nvPr/>
+        </p:nvSpPr>
+        <p:spPr>
+          <a:xfrm>
+            <a:off x="3199601" y="2564207"/>
+            <a:ext cx="2438400" cy="161583"/>
+          </a:xfrm>
+          <a:prstGeom prst="rect">
+            <a:avLst/>
+          </a:prstGeom>
+          <a:noFill/>
+        </p:spPr>
+        <p:txBody>
+          <a:bodyPr wrap="square" lIns="0" tIns="0" rIns="0" bIns="0" rtlCol="0">
+            <a:spAutoFit/>
+          </a:bodyPr>
+          <a:lstStyle/>
+          <a:p>
+            <a:pPr algn="r"/>
+            <a:r>
+              <a:rPr lang="en-US" sz="1050" dirty="0">
+                <a:solidFill>
+                  <a:schemeClr val="accent5">
+                    <a:lumMod val="75000"/>
+                  </a:schemeClr>
+                </a:solidFill>
+              </a:rPr>
+              <a:t>post(</a:t>
+            </a:r>
+            <a:r>
+              <a:rPr lang="en-SG" sz="1050" dirty="0" err="1">
+                <a:solidFill>
+                  <a:schemeClr val="accent5">
+                    <a:lumMod val="75000"/>
+                  </a:schemeClr>
+                </a:solidFill>
+              </a:rPr>
+              <a:t>UserTabChangedEvent</a:t>
+            </a:r>
+            <a:r>
+              <a:rPr lang="en-US" sz="1050" dirty="0">
+                <a:solidFill>
+                  <a:schemeClr val="accent5">
+                    <a:lumMod val="75000"/>
+                  </a:schemeClr>
+                </a:solidFill>
+              </a:rPr>
+              <a:t>)</a:t>
+            </a:r>
+          </a:p>
+        </p:txBody>
+      </p:sp>
+      <p:cxnSp>
+        <p:nvCxnSpPr>
+          <p:cNvPr id="40" name="Straight Arrow Connector 39">
+            <a:extLst>
+              <a:ext uri="{FF2B5EF4-FFF2-40B4-BE49-F238E27FC236}">
+                <a16:creationId xmlns:a16="http://schemas.microsoft.com/office/drawing/2014/main" id="{6B40097A-8D51-4FF8-AB93-DE3328D32AAF}"/>
+              </a:ext>
+            </a:extLst>
+          </p:cNvPr>
+          <p:cNvCxnSpPr>
+            <a:cxnSpLocks/>
+          </p:cNvCxnSpPr>
+          <p:nvPr/>
+        </p:nvCxnSpPr>
+        <p:spPr>
+          <a:xfrm flipH="1">
+            <a:off x="5867685" y="1649455"/>
+            <a:ext cx="2647657" cy="0"/>
+          </a:xfrm>
+          <a:prstGeom prst="straightConnector1">
+            <a:avLst/>
+          </a:prstGeom>
+          <a:ln w="19050">
+            <a:solidFill>
+              <a:schemeClr val="accent6">
+                <a:lumMod val="75000"/>
+              </a:schemeClr>
+            </a:solidFill>
+            <a:prstDash val="sysDash"/>
+            <a:headEnd type="none" w="med" len="med"/>
+            <a:tailEnd type="arrow" w="med" len="med"/>
+          </a:ln>
+        </p:spPr>
+        <p:style>
+          <a:lnRef idx="1">
+            <a:schemeClr val="accent1"/>
+          </a:lnRef>
+          <a:fillRef idx="0">
+            <a:schemeClr val="accent1"/>
+          </a:fillRef>
+          <a:effectRef idx="0">
+            <a:schemeClr val="accent1"/>
+          </a:effectRef>
+          <a:fontRef idx="minor">
+            <a:schemeClr val="tx1"/>
+          </a:fontRef>
+        </p:style>
+      </p:cxnSp>
+      <p:cxnSp>
+        <p:nvCxnSpPr>
+          <p:cNvPr id="41" name="Straight Arrow Connector 40">
+            <a:extLst>
+              <a:ext uri="{FF2B5EF4-FFF2-40B4-BE49-F238E27FC236}">
+                <a16:creationId xmlns:a16="http://schemas.microsoft.com/office/drawing/2014/main" id="{61B7135F-A6F2-43AB-8DED-C629DF885679}"/>
+              </a:ext>
+            </a:extLst>
+          </p:cNvPr>
+          <p:cNvCxnSpPr>
+            <a:cxnSpLocks/>
+          </p:cNvCxnSpPr>
+          <p:nvPr/>
+        </p:nvCxnSpPr>
+        <p:spPr>
+          <a:xfrm>
+            <a:off x="5772200" y="1367116"/>
+            <a:ext cx="2645387" cy="0"/>
+          </a:xfrm>
+          <a:prstGeom prst="straightConnector1">
+            <a:avLst/>
+          </a:prstGeom>
+          <a:ln w="19050">
+            <a:solidFill>
+              <a:schemeClr val="accent5">
+                <a:lumMod val="75000"/>
+              </a:schemeClr>
+            </a:solidFill>
+            <a:headEnd type="none" w="med" len="med"/>
+            <a:tailEnd type="arrow" w="med" len="med"/>
+          </a:ln>
+        </p:spPr>
+        <p:style>
+          <a:lnRef idx="1">
+            <a:schemeClr val="accent1"/>
+          </a:lnRef>
+          <a:fillRef idx="0">
+            <a:schemeClr val="accent1"/>
+          </a:fillRef>
+          <a:effectRef idx="0">
+            <a:schemeClr val="accent1"/>
+          </a:effectRef>
+          <a:fontRef idx="minor">
+            <a:schemeClr val="tx1"/>
+          </a:fontRef>
+        </p:style>
+      </p:cxnSp>
+      <p:sp>
+        <p:nvSpPr>
+          <p:cNvPr id="42" name="TextBox 41">
+            <a:extLst>
+              <a:ext uri="{FF2B5EF4-FFF2-40B4-BE49-F238E27FC236}">
+                <a16:creationId xmlns:a16="http://schemas.microsoft.com/office/drawing/2014/main" id="{8476C773-6686-4BBB-8629-068B4241D0B6}"/>
+              </a:ext>
+            </a:extLst>
+          </p:cNvPr>
+          <p:cNvSpPr txBox="1"/>
+          <p:nvPr/>
+        </p:nvSpPr>
+        <p:spPr>
+          <a:xfrm>
+            <a:off x="6015394" y="1173057"/>
+            <a:ext cx="2659870" cy="161583"/>
+          </a:xfrm>
+          <a:prstGeom prst="rect">
+            <a:avLst/>
+          </a:prstGeom>
+          <a:noFill/>
+        </p:spPr>
+        <p:txBody>
+          <a:bodyPr wrap="square" lIns="0" tIns="0" rIns="0" bIns="0" rtlCol="0">
+            <a:spAutoFit/>
+          </a:bodyPr>
+          <a:lstStyle/>
+          <a:p>
+            <a:r>
+              <a:rPr lang="en-SG" sz="1050" dirty="0" err="1">
+                <a:solidFill>
+                  <a:schemeClr val="accent6">
+                    <a:lumMod val="75000"/>
+                  </a:schemeClr>
+                </a:solidFill>
+              </a:rPr>
+              <a:t>handleCredentialStoreChangedEvent</a:t>
+            </a:r>
+            <a:r>
+              <a:rPr lang="en-US" sz="1050" dirty="0">
+                <a:solidFill>
+                  <a:schemeClr val="accent6">
+                    <a:lumMod val="75000"/>
+                  </a:schemeClr>
+                </a:solidFill>
+              </a:rPr>
+              <a:t>()</a:t>
+            </a:r>
+          </a:p>
+        </p:txBody>
+      </p:sp>
+      <p:cxnSp>
+        <p:nvCxnSpPr>
+          <p:cNvPr id="49" name="Straight Arrow Connector 48">
+            <a:extLst>
+              <a:ext uri="{FF2B5EF4-FFF2-40B4-BE49-F238E27FC236}">
+                <a16:creationId xmlns:a16="http://schemas.microsoft.com/office/drawing/2014/main" id="{494DBAAA-3AAA-43BB-8E8E-A6E1F08D30CE}"/>
+              </a:ext>
+            </a:extLst>
+          </p:cNvPr>
+          <p:cNvCxnSpPr>
+            <a:cxnSpLocks/>
+          </p:cNvCxnSpPr>
+          <p:nvPr/>
+        </p:nvCxnSpPr>
+        <p:spPr>
+          <a:xfrm flipH="1">
+            <a:off x="3111246" y="2432020"/>
+            <a:ext cx="2592370" cy="0"/>
+          </a:xfrm>
+          <a:prstGeom prst="straightConnector1">
+            <a:avLst/>
+          </a:prstGeom>
+          <a:ln w="19050">
+            <a:solidFill>
+              <a:srgbClr val="00B050"/>
+            </a:solidFill>
+            <a:prstDash val="sysDash"/>
+            <a:headEnd type="arrow" w="med" len="med"/>
+            <a:tailEnd type="none" w="med" len="med"/>
+          </a:ln>
+        </p:spPr>
+        <p:style>
+          <a:lnRef idx="1">
+            <a:schemeClr val="accent1"/>
+          </a:lnRef>
+          <a:fillRef idx="0">
+            <a:schemeClr val="accent1"/>
+          </a:fillRef>
+          <a:effectRef idx="0">
+            <a:schemeClr val="accent1"/>
+          </a:effectRef>
+          <a:fontRef idx="minor">
+            <a:schemeClr val="tx1"/>
+          </a:fontRef>
+        </p:style>
+      </p:cxnSp>
+      <p:cxnSp>
+        <p:nvCxnSpPr>
+          <p:cNvPr id="52" name="Straight Arrow Connector 51">
+            <a:extLst>
+              <a:ext uri="{FF2B5EF4-FFF2-40B4-BE49-F238E27FC236}">
+                <a16:creationId xmlns:a16="http://schemas.microsoft.com/office/drawing/2014/main" id="{87BBFA73-FF62-4BB3-BF7E-D25D15AED9FB}"/>
+              </a:ext>
+            </a:extLst>
+          </p:cNvPr>
+          <p:cNvCxnSpPr>
+            <a:cxnSpLocks/>
+          </p:cNvCxnSpPr>
+          <p:nvPr/>
+        </p:nvCxnSpPr>
+        <p:spPr>
+          <a:xfrm flipH="1">
+            <a:off x="3111246" y="3190676"/>
+            <a:ext cx="2592370" cy="0"/>
+          </a:xfrm>
+          <a:prstGeom prst="straightConnector1">
+            <a:avLst/>
+          </a:prstGeom>
+          <a:ln w="19050">
+            <a:solidFill>
+              <a:srgbClr val="00B050"/>
+            </a:solidFill>
+            <a:prstDash val="sysDash"/>
+            <a:headEnd type="arrow" w="med" len="med"/>
+            <a:tailEnd type="none" w="med" len="med"/>
+          </a:ln>
+        </p:spPr>
+        <p:style>
+          <a:lnRef idx="1">
+            <a:schemeClr val="accent1"/>
+          </a:lnRef>
+          <a:fillRef idx="0">
+            <a:schemeClr val="accent1"/>
+          </a:fillRef>
+          <a:effectRef idx="0">
+            <a:schemeClr val="accent1"/>
+          </a:effectRef>
+          <a:fontRef idx="minor">
+            <a:schemeClr val="tx1"/>
+          </a:fontRef>
+        </p:style>
+      </p:cxnSp>
+      <p:sp>
+        <p:nvSpPr>
+          <p:cNvPr id="10" name="Rectangle 9">
+            <a:extLst>
+              <a:ext uri="{FF2B5EF4-FFF2-40B4-BE49-F238E27FC236}">
+                <a16:creationId xmlns:a16="http://schemas.microsoft.com/office/drawing/2014/main" id="{0B1BBF83-CC54-40E3-8472-96EA6F6B0A4D}"/>
+              </a:ext>
+            </a:extLst>
+          </p:cNvPr>
+          <p:cNvSpPr/>
+          <p:nvPr/>
+        </p:nvSpPr>
+        <p:spPr>
+          <a:xfrm>
+            <a:off x="5713570" y="1998637"/>
+            <a:ext cx="142006" cy="1354156"/>
+          </a:xfrm>
+          <a:prstGeom prst="rect">
+            <a:avLst/>
+          </a:prstGeom>
+          <a:solidFill>
+            <a:schemeClr val="accent5">
+              <a:lumMod val="75000"/>
+            </a:schemeClr>
+          </a:solidFill>
+          <a:ln>
+            <a:solidFill>
+              <a:schemeClr val="accent5">
+                <a:lumMod val="75000"/>
+              </a:schemeClr>
+            </a:solidFill>
+          </a:ln>
+          <a:effectLst/>
+        </p:spPr>
+        <p:style>
+          <a:lnRef idx="1">
+            <a:schemeClr val="accent3"/>
+          </a:lnRef>
+          <a:fillRef idx="2">
+            <a:schemeClr val="accent3"/>
+          </a:fillRef>
+          <a:effectRef idx="1">
+            <a:schemeClr val="accent3"/>
+          </a:effectRef>
+          <a:fontRef idx="minor">
+            <a:schemeClr val="dk1"/>
+          </a:fontRef>
+        </p:style>
+        <p:txBody>
+          <a:bodyPr rtlCol="0" anchor="ctr"/>
+          <a:lstStyle/>
+          <a:p>
+            <a:pPr algn="ctr"/>
+            <a:endParaRPr lang="en-SG" sz="1400"/>
+          </a:p>
+        </p:txBody>
+      </p:sp>
+      <p:cxnSp>
+        <p:nvCxnSpPr>
+          <p:cNvPr id="55" name="Straight Arrow Connector 54">
+            <a:extLst>
+              <a:ext uri="{FF2B5EF4-FFF2-40B4-BE49-F238E27FC236}">
+                <a16:creationId xmlns:a16="http://schemas.microsoft.com/office/drawing/2014/main" id="{8F53A69C-EAFB-4778-B3BC-FC275E965909}"/>
+              </a:ext>
+            </a:extLst>
+          </p:cNvPr>
+          <p:cNvCxnSpPr>
+            <a:cxnSpLocks/>
+          </p:cNvCxnSpPr>
+          <p:nvPr/>
+        </p:nvCxnSpPr>
+        <p:spPr>
+          <a:xfrm flipH="1">
+            <a:off x="4191000" y="3346443"/>
+            <a:ext cx="1606274" cy="0"/>
+          </a:xfrm>
+          <a:prstGeom prst="straightConnector1">
+            <a:avLst/>
+          </a:prstGeom>
+          <a:ln w="19050">
+            <a:solidFill>
+              <a:schemeClr val="accent5">
+                <a:lumMod val="75000"/>
+              </a:schemeClr>
+            </a:solidFill>
+            <a:prstDash val="sysDash"/>
+            <a:headEnd type="none" w="med" len="med"/>
+            <a:tailEnd type="arrow" w="med" len="med"/>
+          </a:ln>
+        </p:spPr>
+        <p:style>
+          <a:lnRef idx="1">
+            <a:schemeClr val="accent1"/>
+          </a:lnRef>
+          <a:fillRef idx="0">
+            <a:schemeClr val="accent1"/>
+          </a:fillRef>
+          <a:effectRef idx="0">
+            <a:schemeClr val="accent1"/>
+          </a:effectRef>
+          <a:fontRef idx="minor">
+            <a:schemeClr val="tx1"/>
+          </a:fontRef>
+        </p:style>
+      </p:cxnSp>
+    </p:spTree>
+    <p:extLst>
+      <p:ext uri="{BB962C8B-B14F-4D97-AF65-F5344CB8AC3E}">
+        <p14:creationId xmlns:p14="http://schemas.microsoft.com/office/powerpoint/2010/main" val="1212076133"/>
       </p:ext>
     </p:extLst>
   </p:cSld>

</xml_diff>

<commit_message>
diagrams: resolved discrepancies in Sequence Diagram for RegisterCommand
</commit_message>
<xml_diff>
--- a/docs/diagrams/SDforRegisterCommand.pptx
+++ b/docs/diagrams/SDforRegisterCommand.pptx
@@ -209,7 +209,7 @@
           <a:p>
             <a:fld id="{F5CC4B3F-88C1-4FFA-B1B6-F41C21DC6924}" type="datetimeFigureOut">
               <a:rPr lang="en-US" smtClean="0"/>
-              <a:t>11/3/2018</a:t>
+              <a:t>11/10/2018</a:t>
             </a:fld>
             <a:endParaRPr lang="en-US"/>
           </a:p>
@@ -655,7 +655,7 @@
           <a:p>
             <a:fld id="{78C97017-6FC3-485B-9764-EAC9E56C1D49}" type="datetimeFigureOut">
               <a:rPr lang="en-US" smtClean="0"/>
-              <a:t>11/3/2018</a:t>
+              <a:t>11/10/2018</a:t>
             </a:fld>
             <a:endParaRPr lang="en-US"/>
           </a:p>
@@ -823,7 +823,7 @@
           <a:p>
             <a:fld id="{78C97017-6FC3-485B-9764-EAC9E56C1D49}" type="datetimeFigureOut">
               <a:rPr lang="en-US" smtClean="0"/>
-              <a:t>11/3/2018</a:t>
+              <a:t>11/10/2018</a:t>
             </a:fld>
             <a:endParaRPr lang="en-US"/>
           </a:p>
@@ -1001,7 +1001,7 @@
           <a:p>
             <a:fld id="{78C97017-6FC3-485B-9764-EAC9E56C1D49}" type="datetimeFigureOut">
               <a:rPr lang="en-US" smtClean="0"/>
-              <a:t>11/3/2018</a:t>
+              <a:t>11/10/2018</a:t>
             </a:fld>
             <a:endParaRPr lang="en-US"/>
           </a:p>
@@ -1169,7 +1169,7 @@
           <a:p>
             <a:fld id="{78C97017-6FC3-485B-9764-EAC9E56C1D49}" type="datetimeFigureOut">
               <a:rPr lang="en-US" smtClean="0"/>
-              <a:t>11/3/2018</a:t>
+              <a:t>11/10/2018</a:t>
             </a:fld>
             <a:endParaRPr lang="en-US"/>
           </a:p>
@@ -1414,7 +1414,7 @@
           <a:p>
             <a:fld id="{78C97017-6FC3-485B-9764-EAC9E56C1D49}" type="datetimeFigureOut">
               <a:rPr lang="en-US" smtClean="0"/>
-              <a:t>11/3/2018</a:t>
+              <a:t>11/10/2018</a:t>
             </a:fld>
             <a:endParaRPr lang="en-US"/>
           </a:p>
@@ -1699,7 +1699,7 @@
           <a:p>
             <a:fld id="{78C97017-6FC3-485B-9764-EAC9E56C1D49}" type="datetimeFigureOut">
               <a:rPr lang="en-US" smtClean="0"/>
-              <a:t>11/3/2018</a:t>
+              <a:t>11/10/2018</a:t>
             </a:fld>
             <a:endParaRPr lang="en-US"/>
           </a:p>
@@ -2118,7 +2118,7 @@
           <a:p>
             <a:fld id="{78C97017-6FC3-485B-9764-EAC9E56C1D49}" type="datetimeFigureOut">
               <a:rPr lang="en-US" smtClean="0"/>
-              <a:t>11/3/2018</a:t>
+              <a:t>11/10/2018</a:t>
             </a:fld>
             <a:endParaRPr lang="en-US"/>
           </a:p>
@@ -2235,7 +2235,7 @@
           <a:p>
             <a:fld id="{78C97017-6FC3-485B-9764-EAC9E56C1D49}" type="datetimeFigureOut">
               <a:rPr lang="en-US" smtClean="0"/>
-              <a:t>11/3/2018</a:t>
+              <a:t>11/10/2018</a:t>
             </a:fld>
             <a:endParaRPr lang="en-US"/>
           </a:p>
@@ -2330,7 +2330,7 @@
           <a:p>
             <a:fld id="{78C97017-6FC3-485B-9764-EAC9E56C1D49}" type="datetimeFigureOut">
               <a:rPr lang="en-US" smtClean="0"/>
-              <a:t>11/3/2018</a:t>
+              <a:t>11/10/2018</a:t>
             </a:fld>
             <a:endParaRPr lang="en-US"/>
           </a:p>
@@ -2605,7 +2605,7 @@
           <a:p>
             <a:fld id="{78C97017-6FC3-485B-9764-EAC9E56C1D49}" type="datetimeFigureOut">
               <a:rPr lang="en-US" smtClean="0"/>
-              <a:t>11/3/2018</a:t>
+              <a:t>11/10/2018</a:t>
             </a:fld>
             <a:endParaRPr lang="en-US"/>
           </a:p>
@@ -2857,7 +2857,7 @@
           <a:p>
             <a:fld id="{78C97017-6FC3-485B-9764-EAC9E56C1D49}" type="datetimeFigureOut">
               <a:rPr lang="en-US" smtClean="0"/>
-              <a:t>11/3/2018</a:t>
+              <a:t>11/10/2018</a:t>
             </a:fld>
             <a:endParaRPr lang="en-US"/>
           </a:p>
@@ -3071,7 +3071,7 @@
           <a:p>
             <a:fld id="{78C97017-6FC3-485B-9764-EAC9E56C1D49}" type="datetimeFigureOut">
               <a:rPr lang="en-US" smtClean="0"/>
-              <a:t>11/3/2018</a:t>
+              <a:t>11/10/2018</a:t>
             </a:fld>
             <a:endParaRPr lang="en-US"/>
           </a:p>
@@ -4344,7 +4344,7 @@
         </p:nvSpPr>
         <p:spPr>
           <a:xfrm>
-            <a:off x="5946702" y="1488767"/>
+            <a:off x="5946702" y="1371600"/>
             <a:ext cx="2438400" cy="161583"/>
           </a:xfrm>
           <a:prstGeom prst="rect">
@@ -4589,8 +4589,8 @@
         </p:nvSpPr>
         <p:spPr>
           <a:xfrm>
-            <a:off x="8042397" y="1690640"/>
-            <a:ext cx="142006" cy="441298"/>
+            <a:off x="8042397" y="1573473"/>
+            <a:ext cx="142006" cy="329109"/>
           </a:xfrm>
           <a:prstGeom prst="rect">
             <a:avLst/>
@@ -4642,7 +4642,7 @@
         </p:nvCxnSpPr>
         <p:spPr>
           <a:xfrm>
-            <a:off x="5867400" y="1690640"/>
+            <a:off x="5867400" y="1573473"/>
             <a:ext cx="2165341" cy="1"/>
           </a:xfrm>
           <a:prstGeom prst="straightConnector1">
@@ -4839,8 +4839,8 @@
         </p:nvSpPr>
         <p:spPr>
           <a:xfrm>
-            <a:off x="10644638" y="1841421"/>
-            <a:ext cx="124478" cy="287409"/>
+            <a:off x="10644638" y="1681738"/>
+            <a:ext cx="124478" cy="210775"/>
           </a:xfrm>
           <a:prstGeom prst="rect">
             <a:avLst/>
@@ -4898,7 +4898,7 @@
         </p:nvCxnSpPr>
         <p:spPr>
           <a:xfrm flipH="1">
-            <a:off x="8188184" y="2124076"/>
+            <a:off x="8188184" y="1885017"/>
             <a:ext cx="2492780" cy="4980"/>
           </a:xfrm>
           <a:prstGeom prst="straightConnector1">
@@ -4944,7 +4944,7 @@
         </p:nvCxnSpPr>
         <p:spPr>
           <a:xfrm>
-            <a:off x="8153400" y="1853933"/>
+            <a:off x="8153400" y="1694250"/>
             <a:ext cx="2493056" cy="0"/>
           </a:xfrm>
           <a:prstGeom prst="straightConnector1">
@@ -4989,7 +4989,7 @@
         </p:nvSpPr>
         <p:spPr>
           <a:xfrm>
-            <a:off x="8380056" y="1650350"/>
+            <a:off x="8380056" y="1490667"/>
             <a:ext cx="2659870" cy="161583"/>
           </a:xfrm>
           <a:prstGeom prst="rect">
@@ -5040,7 +5040,7 @@
         </p:nvGrpSpPr>
         <p:grpSpPr>
           <a:xfrm flipH="1">
-            <a:off x="10736494" y="1841420"/>
+            <a:off x="10739576" y="1627645"/>
             <a:ext cx="217349" cy="270072"/>
             <a:chOff x="1028134" y="5612032"/>
             <a:chExt cx="217349" cy="270072"/>
@@ -5217,7 +5217,7 @@
         </p:nvSpPr>
         <p:spPr>
           <a:xfrm>
-            <a:off x="11008062" y="1650350"/>
+            <a:off x="11008062" y="1490667"/>
             <a:ext cx="539047" cy="323165"/>
           </a:xfrm>
           <a:prstGeom prst="rect">
@@ -5437,7 +5437,7 @@
         <p:spPr>
           <a:xfrm>
             <a:off x="5722726" y="1988200"/>
-            <a:ext cx="142006" cy="305580"/>
+            <a:ext cx="142006" cy="249874"/>
           </a:xfrm>
           <a:prstGeom prst="rect">
             <a:avLst/>
@@ -5489,7 +5489,7 @@
         </p:nvSpPr>
         <p:spPr>
           <a:xfrm>
-            <a:off x="8037037" y="2636210"/>
+            <a:off x="8039729" y="2835302"/>
             <a:ext cx="142006" cy="441298"/>
           </a:xfrm>
           <a:prstGeom prst="rect">
@@ -5546,7 +5546,7 @@
         </p:nvCxnSpPr>
         <p:spPr>
           <a:xfrm>
-            <a:off x="3768052" y="2636210"/>
+            <a:off x="3770744" y="2835302"/>
             <a:ext cx="4257810" cy="0"/>
           </a:xfrm>
           <a:prstGeom prst="straightConnector1">
@@ -5588,7 +5588,7 @@
         </p:nvSpPr>
         <p:spPr>
           <a:xfrm>
-            <a:off x="5867400" y="2438400"/>
+            <a:off x="5870092" y="2637492"/>
             <a:ext cx="2438400" cy="161583"/>
           </a:xfrm>
           <a:prstGeom prst="rect">
@@ -5649,7 +5649,7 @@
         </p:nvCxnSpPr>
         <p:spPr>
           <a:xfrm>
-            <a:off x="3772293" y="2876815"/>
+            <a:off x="3774985" y="3075907"/>
             <a:ext cx="4257810" cy="0"/>
           </a:xfrm>
           <a:prstGeom prst="straightConnector1">
@@ -5691,7 +5691,7 @@
         </p:nvSpPr>
         <p:spPr>
           <a:xfrm>
-            <a:off x="5867400" y="2679005"/>
+            <a:off x="6370131" y="2882759"/>
             <a:ext cx="2438400" cy="161583"/>
           </a:xfrm>
           <a:prstGeom prst="rect">
@@ -5724,6 +5724,749 @@
                 </a:solidFill>
               </a:rPr>
               <a:t>UserTabChangedEvent</a:t>
+            </a:r>
+            <a:r>
+              <a:rPr lang="en-US" sz="1050" dirty="0">
+                <a:solidFill>
+                  <a:schemeClr val="accent5">
+                    <a:lumMod val="75000"/>
+                  </a:schemeClr>
+                </a:solidFill>
+              </a:rPr>
+              <a:t>)</a:t>
+            </a:r>
+          </a:p>
+        </p:txBody>
+      </p:sp>
+      <p:cxnSp>
+        <p:nvCxnSpPr>
+          <p:cNvPr id="60" name="Straight Arrow Connector 59">
+            <a:extLst>
+              <a:ext uri="{FF2B5EF4-FFF2-40B4-BE49-F238E27FC236}">
+                <a16:creationId xmlns:a16="http://schemas.microsoft.com/office/drawing/2014/main" id="{422D4C33-62AE-4D80-B673-4DB86BAD4AA3}"/>
+              </a:ext>
+            </a:extLst>
+          </p:cNvPr>
+          <p:cNvCxnSpPr/>
+          <p:nvPr/>
+        </p:nvCxnSpPr>
+        <p:spPr>
+          <a:xfrm>
+            <a:off x="3806206" y="2349966"/>
+            <a:ext cx="1908794" cy="0"/>
+          </a:xfrm>
+          <a:prstGeom prst="straightConnector1">
+            <a:avLst/>
+          </a:prstGeom>
+          <a:ln w="19050">
+            <a:solidFill>
+              <a:srgbClr val="0070C0"/>
+            </a:solidFill>
+            <a:tailEnd type="arrow"/>
+          </a:ln>
+        </p:spPr>
+        <p:style>
+          <a:lnRef idx="1">
+            <a:schemeClr val="accent1"/>
+          </a:lnRef>
+          <a:fillRef idx="0">
+            <a:schemeClr val="accent1"/>
+          </a:fillRef>
+          <a:effectRef idx="0">
+            <a:schemeClr val="accent1"/>
+          </a:effectRef>
+          <a:fontRef idx="minor">
+            <a:schemeClr val="tx1"/>
+          </a:fontRef>
+        </p:style>
+      </p:cxnSp>
+      <p:sp>
+        <p:nvSpPr>
+          <p:cNvPr id="61" name="TextBox 60">
+            <a:extLst>
+              <a:ext uri="{FF2B5EF4-FFF2-40B4-BE49-F238E27FC236}">
+                <a16:creationId xmlns:a16="http://schemas.microsoft.com/office/drawing/2014/main" id="{99D9312B-979B-45F6-90C2-A6C3D6FA91D4}"/>
+              </a:ext>
+            </a:extLst>
+          </p:cNvPr>
+          <p:cNvSpPr txBox="1"/>
+          <p:nvPr/>
+        </p:nvSpPr>
+        <p:spPr>
+          <a:xfrm>
+            <a:off x="4189035" y="2161848"/>
+            <a:ext cx="2035606" cy="161583"/>
+          </a:xfrm>
+          <a:prstGeom prst="rect">
+            <a:avLst/>
+          </a:prstGeom>
+          <a:noFill/>
+        </p:spPr>
+        <p:txBody>
+          <a:bodyPr wrap="square" lIns="0" tIns="0" rIns="0" bIns="0" rtlCol="0">
+            <a:spAutoFit/>
+          </a:bodyPr>
+          <a:lstStyle/>
+          <a:p>
+            <a:r>
+              <a:rPr lang="en-SG" sz="1050" dirty="0" err="1">
+                <a:solidFill>
+                  <a:srgbClr val="6F42C1"/>
+                </a:solidFill>
+                <a:latin typeface="SFMono-Regular"/>
+              </a:rPr>
+              <a:t>saveUserFile</a:t>
+            </a:r>
+            <a:r>
+              <a:rPr lang="en-US" sz="1050" dirty="0">
+                <a:solidFill>
+                  <a:srgbClr val="7030A0"/>
+                </a:solidFill>
+              </a:rPr>
+              <a:t>(…)</a:t>
+            </a:r>
+          </a:p>
+        </p:txBody>
+      </p:sp>
+      <p:sp>
+        <p:nvSpPr>
+          <p:cNvPr id="62" name="Rectangle 61">
+            <a:extLst>
+              <a:ext uri="{FF2B5EF4-FFF2-40B4-BE49-F238E27FC236}">
+                <a16:creationId xmlns:a16="http://schemas.microsoft.com/office/drawing/2014/main" id="{20C1B4D6-0707-4D4C-9A61-C0D1FB0CE774}"/>
+              </a:ext>
+            </a:extLst>
+          </p:cNvPr>
+          <p:cNvSpPr/>
+          <p:nvPr/>
+        </p:nvSpPr>
+        <p:spPr>
+          <a:xfrm>
+            <a:off x="5722726" y="2339605"/>
+            <a:ext cx="142006" cy="249874"/>
+          </a:xfrm>
+          <a:prstGeom prst="rect">
+            <a:avLst/>
+          </a:prstGeom>
+          <a:solidFill>
+            <a:srgbClr val="7030A0"/>
+          </a:solidFill>
+          <a:ln>
+            <a:solidFill>
+              <a:srgbClr val="7030A0"/>
+            </a:solidFill>
+          </a:ln>
+          <a:effectLst/>
+        </p:spPr>
+        <p:style>
+          <a:lnRef idx="1">
+            <a:schemeClr val="accent3"/>
+          </a:lnRef>
+          <a:fillRef idx="2">
+            <a:schemeClr val="accent3"/>
+          </a:fillRef>
+          <a:effectRef idx="1">
+            <a:schemeClr val="accent3"/>
+          </a:effectRef>
+          <a:fontRef idx="minor">
+            <a:schemeClr val="dk1"/>
+          </a:fontRef>
+        </p:style>
+        <p:txBody>
+          <a:bodyPr rtlCol="0" anchor="ctr"/>
+          <a:lstStyle/>
+          <a:p>
+            <a:pPr algn="ctr"/>
+            <a:endParaRPr lang="en-SG" sz="1400"/>
+          </a:p>
+        </p:txBody>
+      </p:sp>
+      <p:sp>
+        <p:nvSpPr>
+          <p:cNvPr id="63" name="Rectangle 62">
+            <a:extLst>
+              <a:ext uri="{FF2B5EF4-FFF2-40B4-BE49-F238E27FC236}">
+                <a16:creationId xmlns:a16="http://schemas.microsoft.com/office/drawing/2014/main" id="{4B127097-B924-4758-A6FB-F53A02CC259D}"/>
+              </a:ext>
+            </a:extLst>
+          </p:cNvPr>
+          <p:cNvSpPr/>
+          <p:nvPr/>
+        </p:nvSpPr>
+        <p:spPr>
+          <a:xfrm>
+            <a:off x="8028554" y="2366199"/>
+            <a:ext cx="142006" cy="223280"/>
+          </a:xfrm>
+          <a:prstGeom prst="rect">
+            <a:avLst/>
+          </a:prstGeom>
+          <a:solidFill>
+            <a:schemeClr val="accent5">
+              <a:lumMod val="75000"/>
+            </a:schemeClr>
+          </a:solidFill>
+          <a:ln>
+            <a:solidFill>
+              <a:schemeClr val="accent5">
+                <a:lumMod val="75000"/>
+              </a:schemeClr>
+            </a:solidFill>
+          </a:ln>
+          <a:effectLst/>
+        </p:spPr>
+        <p:style>
+          <a:lnRef idx="1">
+            <a:schemeClr val="accent3"/>
+          </a:lnRef>
+          <a:fillRef idx="2">
+            <a:schemeClr val="accent3"/>
+          </a:fillRef>
+          <a:effectRef idx="1">
+            <a:schemeClr val="accent3"/>
+          </a:effectRef>
+          <a:fontRef idx="minor">
+            <a:schemeClr val="dk1"/>
+          </a:fontRef>
+        </p:style>
+        <p:txBody>
+          <a:bodyPr rtlCol="0" anchor="ctr"/>
+          <a:lstStyle/>
+          <a:p>
+            <a:pPr algn="ctr"/>
+            <a:endParaRPr lang="en-SG" sz="1400"/>
+          </a:p>
+        </p:txBody>
+      </p:sp>
+      <p:sp>
+        <p:nvSpPr>
+          <p:cNvPr id="64" name="Rectangle 63">
+            <a:extLst>
+              <a:ext uri="{FF2B5EF4-FFF2-40B4-BE49-F238E27FC236}">
+                <a16:creationId xmlns:a16="http://schemas.microsoft.com/office/drawing/2014/main" id="{85E8901E-50D9-44C2-8DC4-F16023D0CC0D}"/>
+              </a:ext>
+            </a:extLst>
+          </p:cNvPr>
+          <p:cNvSpPr/>
+          <p:nvPr/>
+        </p:nvSpPr>
+        <p:spPr>
+          <a:xfrm>
+            <a:off x="10644638" y="2371036"/>
+            <a:ext cx="124478" cy="210775"/>
+          </a:xfrm>
+          <a:prstGeom prst="rect">
+            <a:avLst/>
+          </a:prstGeom>
+          <a:solidFill>
+            <a:schemeClr val="accent6">
+              <a:lumMod val="75000"/>
+            </a:schemeClr>
+          </a:solidFill>
+          <a:ln>
+            <a:solidFill>
+              <a:schemeClr val="accent6">
+                <a:lumMod val="75000"/>
+              </a:schemeClr>
+            </a:solidFill>
+          </a:ln>
+          <a:effectLst/>
+        </p:spPr>
+        <p:style>
+          <a:lnRef idx="1">
+            <a:schemeClr val="accent3"/>
+          </a:lnRef>
+          <a:fillRef idx="2">
+            <a:schemeClr val="accent3"/>
+          </a:fillRef>
+          <a:effectRef idx="1">
+            <a:schemeClr val="accent3"/>
+          </a:effectRef>
+          <a:fontRef idx="minor">
+            <a:schemeClr val="dk1"/>
+          </a:fontRef>
+        </p:style>
+        <p:txBody>
+          <a:bodyPr rtlCol="0" anchor="ctr"/>
+          <a:lstStyle/>
+          <a:p>
+            <a:pPr algn="ctr"/>
+            <a:endParaRPr lang="en-SG" sz="1400"/>
+          </a:p>
+        </p:txBody>
+      </p:sp>
+      <p:cxnSp>
+        <p:nvCxnSpPr>
+          <p:cNvPr id="65" name="Straight Arrow Connector 64">
+            <a:extLst>
+              <a:ext uri="{FF2B5EF4-FFF2-40B4-BE49-F238E27FC236}">
+                <a16:creationId xmlns:a16="http://schemas.microsoft.com/office/drawing/2014/main" id="{0EFE0339-0F5E-4F6A-BFDF-4A0A78DE2534}"/>
+              </a:ext>
+            </a:extLst>
+          </p:cNvPr>
+          <p:cNvCxnSpPr>
+            <a:cxnSpLocks/>
+          </p:cNvCxnSpPr>
+          <p:nvPr/>
+        </p:nvCxnSpPr>
+        <p:spPr>
+          <a:xfrm flipH="1">
+            <a:off x="8188184" y="2574315"/>
+            <a:ext cx="2492780" cy="4980"/>
+          </a:xfrm>
+          <a:prstGeom prst="straightConnector1">
+            <a:avLst/>
+          </a:prstGeom>
+          <a:ln w="19050">
+            <a:solidFill>
+              <a:schemeClr val="accent6">
+                <a:lumMod val="75000"/>
+              </a:schemeClr>
+            </a:solidFill>
+            <a:prstDash val="sysDash"/>
+            <a:headEnd type="none" w="med" len="med"/>
+            <a:tailEnd type="arrow" w="med" len="med"/>
+          </a:ln>
+        </p:spPr>
+        <p:style>
+          <a:lnRef idx="1">
+            <a:schemeClr val="accent1"/>
+          </a:lnRef>
+          <a:fillRef idx="0">
+            <a:schemeClr val="accent1"/>
+          </a:fillRef>
+          <a:effectRef idx="0">
+            <a:schemeClr val="accent1"/>
+          </a:effectRef>
+          <a:fontRef idx="minor">
+            <a:schemeClr val="tx1"/>
+          </a:fontRef>
+        </p:style>
+      </p:cxnSp>
+      <p:cxnSp>
+        <p:nvCxnSpPr>
+          <p:cNvPr id="66" name="Straight Arrow Connector 65">
+            <a:extLst>
+              <a:ext uri="{FF2B5EF4-FFF2-40B4-BE49-F238E27FC236}">
+                <a16:creationId xmlns:a16="http://schemas.microsoft.com/office/drawing/2014/main" id="{0552B5E5-D8C2-49FF-AB04-7A371F1D7212}"/>
+              </a:ext>
+            </a:extLst>
+          </p:cNvPr>
+          <p:cNvCxnSpPr/>
+          <p:nvPr/>
+        </p:nvCxnSpPr>
+        <p:spPr>
+          <a:xfrm>
+            <a:off x="8153400" y="2383548"/>
+            <a:ext cx="2493056" cy="0"/>
+          </a:xfrm>
+          <a:prstGeom prst="straightConnector1">
+            <a:avLst/>
+          </a:prstGeom>
+          <a:ln w="19050">
+            <a:solidFill>
+              <a:schemeClr val="accent5">
+                <a:lumMod val="75000"/>
+              </a:schemeClr>
+            </a:solidFill>
+            <a:headEnd type="none" w="med" len="med"/>
+            <a:tailEnd type="arrow" w="med" len="med"/>
+          </a:ln>
+        </p:spPr>
+        <p:style>
+          <a:lnRef idx="1">
+            <a:schemeClr val="accent1"/>
+          </a:lnRef>
+          <a:fillRef idx="0">
+            <a:schemeClr val="accent1"/>
+          </a:fillRef>
+          <a:effectRef idx="0">
+            <a:schemeClr val="accent1"/>
+          </a:effectRef>
+          <a:fontRef idx="minor">
+            <a:schemeClr val="tx1"/>
+          </a:fontRef>
+        </p:style>
+      </p:cxnSp>
+      <p:sp>
+        <p:nvSpPr>
+          <p:cNvPr id="67" name="TextBox 66">
+            <a:extLst>
+              <a:ext uri="{FF2B5EF4-FFF2-40B4-BE49-F238E27FC236}">
+                <a16:creationId xmlns:a16="http://schemas.microsoft.com/office/drawing/2014/main" id="{2A170453-6CFF-4272-A620-71B7B87B2E51}"/>
+              </a:ext>
+            </a:extLst>
+          </p:cNvPr>
+          <p:cNvSpPr txBox="1"/>
+          <p:nvPr/>
+        </p:nvSpPr>
+        <p:spPr>
+          <a:xfrm>
+            <a:off x="8380056" y="2179965"/>
+            <a:ext cx="2659870" cy="161583"/>
+          </a:xfrm>
+          <a:prstGeom prst="rect">
+            <a:avLst/>
+          </a:prstGeom>
+          <a:noFill/>
+        </p:spPr>
+        <p:txBody>
+          <a:bodyPr wrap="square" lIns="0" tIns="0" rIns="0" bIns="0" rtlCol="0">
+            <a:spAutoFit/>
+          </a:bodyPr>
+          <a:lstStyle/>
+          <a:p>
+            <a:r>
+              <a:rPr lang="en-SG" sz="1050" dirty="0" err="1">
+                <a:solidFill>
+                  <a:schemeClr val="accent6">
+                    <a:lumMod val="75000"/>
+                  </a:schemeClr>
+                </a:solidFill>
+              </a:rPr>
+              <a:t>handleSaveUserChangedEvent</a:t>
+            </a:r>
+            <a:r>
+              <a:rPr lang="en-US" sz="1050" dirty="0">
+                <a:solidFill>
+                  <a:schemeClr val="accent6">
+                    <a:lumMod val="75000"/>
+                  </a:schemeClr>
+                </a:solidFill>
+              </a:rPr>
+              <a:t>()</a:t>
+            </a:r>
+          </a:p>
+        </p:txBody>
+      </p:sp>
+      <p:grpSp>
+        <p:nvGrpSpPr>
+          <p:cNvPr id="68" name="Group 67">
+            <a:extLst>
+              <a:ext uri="{FF2B5EF4-FFF2-40B4-BE49-F238E27FC236}">
+                <a16:creationId xmlns:a16="http://schemas.microsoft.com/office/drawing/2014/main" id="{906029C9-73FD-449E-BBE4-64A5E6FCEA32}"/>
+              </a:ext>
+            </a:extLst>
+          </p:cNvPr>
+          <p:cNvGrpSpPr/>
+          <p:nvPr/>
+        </p:nvGrpSpPr>
+        <p:grpSpPr>
+          <a:xfrm flipH="1">
+            <a:off x="10739576" y="2316943"/>
+            <a:ext cx="217349" cy="270072"/>
+            <a:chOff x="1028134" y="5612032"/>
+            <a:chExt cx="217349" cy="270072"/>
+          </a:xfrm>
+        </p:grpSpPr>
+        <p:sp>
+          <p:nvSpPr>
+            <p:cNvPr id="69" name="Freeform 53">
+              <a:extLst>
+                <a:ext uri="{FF2B5EF4-FFF2-40B4-BE49-F238E27FC236}">
+                  <a16:creationId xmlns:a16="http://schemas.microsoft.com/office/drawing/2014/main" id="{F09021C6-0DF9-4E30-9E43-F77353A9239D}"/>
+                </a:ext>
+              </a:extLst>
+            </p:cNvPr>
+            <p:cNvSpPr/>
+            <p:nvPr/>
+          </p:nvSpPr>
+          <p:spPr>
+            <a:xfrm rot="2600998" flipH="1" flipV="1">
+              <a:off x="1028134" y="5612032"/>
+              <a:ext cx="167452" cy="116880"/>
+            </a:xfrm>
+            <a:custGeom>
+              <a:avLst/>
+              <a:gdLst>
+                <a:gd name="connsiteX0" fmla="*/ 0 w 226400"/>
+                <a:gd name="connsiteY0" fmla="*/ 32920 h 171466"/>
+                <a:gd name="connsiteX1" fmla="*/ 157018 w 226400"/>
+                <a:gd name="connsiteY1" fmla="*/ 5211 h 171466"/>
+                <a:gd name="connsiteX2" fmla="*/ 221673 w 226400"/>
+                <a:gd name="connsiteY2" fmla="*/ 125284 h 171466"/>
+                <a:gd name="connsiteX3" fmla="*/ 36945 w 226400"/>
+                <a:gd name="connsiteY3" fmla="*/ 171466 h 171466"/>
+              </a:gdLst>
+              <a:ahLst/>
+              <a:cxnLst>
+                <a:cxn ang="0">
+                  <a:pos x="connsiteX0" y="connsiteY0"/>
+                </a:cxn>
+                <a:cxn ang="0">
+                  <a:pos x="connsiteX1" y="connsiteY1"/>
+                </a:cxn>
+                <a:cxn ang="0">
+                  <a:pos x="connsiteX2" y="connsiteY2"/>
+                </a:cxn>
+                <a:cxn ang="0">
+                  <a:pos x="connsiteX3" y="connsiteY3"/>
+                </a:cxn>
+              </a:cxnLst>
+              <a:rect l="l" t="t" r="r" b="b"/>
+              <a:pathLst>
+                <a:path w="226400" h="171466">
+                  <a:moveTo>
+                    <a:pt x="0" y="32920"/>
+                  </a:moveTo>
+                  <a:cubicBezTo>
+                    <a:pt x="60036" y="11368"/>
+                    <a:pt x="120073" y="-10183"/>
+                    <a:pt x="157018" y="5211"/>
+                  </a:cubicBezTo>
+                  <a:cubicBezTo>
+                    <a:pt x="193963" y="20605"/>
+                    <a:pt x="241685" y="97575"/>
+                    <a:pt x="221673" y="125284"/>
+                  </a:cubicBezTo>
+                  <a:cubicBezTo>
+                    <a:pt x="201661" y="152993"/>
+                    <a:pt x="119303" y="162229"/>
+                    <a:pt x="36945" y="171466"/>
+                  </a:cubicBezTo>
+                </a:path>
+              </a:pathLst>
+            </a:custGeom>
+            <a:ln w="19050">
+              <a:solidFill>
+                <a:schemeClr val="accent6">
+                  <a:lumMod val="75000"/>
+                </a:schemeClr>
+              </a:solidFill>
+              <a:headEnd type="arrow" w="med" len="med"/>
+              <a:tailEnd type="none" w="med" len="med"/>
+            </a:ln>
+          </p:spPr>
+          <p:style>
+            <a:lnRef idx="1">
+              <a:schemeClr val="accent1"/>
+            </a:lnRef>
+            <a:fillRef idx="0">
+              <a:schemeClr val="accent1"/>
+            </a:fillRef>
+            <a:effectRef idx="0">
+              <a:schemeClr val="accent1"/>
+            </a:effectRef>
+            <a:fontRef idx="minor">
+              <a:schemeClr val="tx1"/>
+            </a:fontRef>
+          </p:style>
+          <p:txBody>
+            <a:bodyPr rtlCol="0" anchor="ctr"/>
+            <a:lstStyle/>
+            <a:p>
+              <a:pPr algn="ctr"/>
+              <a:endParaRPr lang="en-SG"/>
+            </a:p>
+          </p:txBody>
+        </p:sp>
+        <p:sp>
+          <p:nvSpPr>
+            <p:cNvPr id="70" name="Rectangle 69">
+              <a:extLst>
+                <a:ext uri="{FF2B5EF4-FFF2-40B4-BE49-F238E27FC236}">
+                  <a16:creationId xmlns:a16="http://schemas.microsoft.com/office/drawing/2014/main" id="{7AE60A33-9FEC-4795-9AB6-2F02B8B919D2}"/>
+                </a:ext>
+              </a:extLst>
+            </p:cNvPr>
+            <p:cNvSpPr/>
+            <p:nvPr/>
+          </p:nvSpPr>
+          <p:spPr>
+            <a:xfrm>
+              <a:off x="1147403" y="5712513"/>
+              <a:ext cx="98080" cy="169591"/>
+            </a:xfrm>
+            <a:prstGeom prst="rect">
+              <a:avLst/>
+            </a:prstGeom>
+            <a:solidFill>
+              <a:schemeClr val="accent6">
+                <a:lumMod val="75000"/>
+              </a:schemeClr>
+            </a:solidFill>
+            <a:ln>
+              <a:solidFill>
+                <a:schemeClr val="bg1"/>
+              </a:solidFill>
+            </a:ln>
+            <a:effectLst/>
+          </p:spPr>
+          <p:style>
+            <a:lnRef idx="1">
+              <a:schemeClr val="accent3"/>
+            </a:lnRef>
+            <a:fillRef idx="2">
+              <a:schemeClr val="accent3"/>
+            </a:fillRef>
+            <a:effectRef idx="1">
+              <a:schemeClr val="accent3"/>
+            </a:effectRef>
+            <a:fontRef idx="minor">
+              <a:schemeClr val="dk1"/>
+            </a:fontRef>
+          </p:style>
+          <p:txBody>
+            <a:bodyPr rtlCol="0" anchor="ctr"/>
+            <a:lstStyle/>
+            <a:p>
+              <a:pPr algn="ctr"/>
+              <a:endParaRPr lang="en-SG" sz="1400"/>
+            </a:p>
+          </p:txBody>
+        </p:sp>
+      </p:grpSp>
+      <p:sp>
+        <p:nvSpPr>
+          <p:cNvPr id="71" name="TextBox 70">
+            <a:extLst>
+              <a:ext uri="{FF2B5EF4-FFF2-40B4-BE49-F238E27FC236}">
+                <a16:creationId xmlns:a16="http://schemas.microsoft.com/office/drawing/2014/main" id="{E0230B48-CBA9-4DDB-AA25-6E8285F3A108}"/>
+              </a:ext>
+            </a:extLst>
+          </p:cNvPr>
+          <p:cNvSpPr txBox="1"/>
+          <p:nvPr/>
+        </p:nvSpPr>
+        <p:spPr>
+          <a:xfrm>
+            <a:off x="11008062" y="2179965"/>
+            <a:ext cx="539047" cy="323165"/>
+          </a:xfrm>
+          <a:prstGeom prst="rect">
+            <a:avLst/>
+          </a:prstGeom>
+          <a:noFill/>
+        </p:spPr>
+        <p:txBody>
+          <a:bodyPr wrap="square" lIns="0" tIns="0" rIns="0" bIns="0" rtlCol="0">
+            <a:spAutoFit/>
+          </a:bodyPr>
+          <a:lstStyle/>
+          <a:p>
+            <a:r>
+              <a:rPr lang="en-US" sz="1050" dirty="0">
+                <a:solidFill>
+                  <a:schemeClr val="accent6">
+                    <a:lumMod val="75000"/>
+                  </a:schemeClr>
+                </a:solidFill>
+              </a:rPr>
+              <a:t>Save </a:t>
+            </a:r>
+            <a:br>
+              <a:rPr lang="en-US" sz="1050" dirty="0">
+                <a:solidFill>
+                  <a:schemeClr val="accent6">
+                    <a:lumMod val="75000"/>
+                  </a:schemeClr>
+                </a:solidFill>
+              </a:rPr>
+            </a:br>
+            <a:r>
+              <a:rPr lang="en-US" sz="1050" dirty="0">
+                <a:solidFill>
+                  <a:schemeClr val="accent6">
+                    <a:lumMod val="75000"/>
+                  </a:schemeClr>
+                </a:solidFill>
+              </a:rPr>
+              <a:t>to file</a:t>
+            </a:r>
+          </a:p>
+        </p:txBody>
+      </p:sp>
+      <p:cxnSp>
+        <p:nvCxnSpPr>
+          <p:cNvPr id="72" name="Straight Arrow Connector 71">
+            <a:extLst>
+              <a:ext uri="{FF2B5EF4-FFF2-40B4-BE49-F238E27FC236}">
+                <a16:creationId xmlns:a16="http://schemas.microsoft.com/office/drawing/2014/main" id="{4DA06215-61BA-4C61-A896-055033ABFF9E}"/>
+              </a:ext>
+            </a:extLst>
+          </p:cNvPr>
+          <p:cNvCxnSpPr>
+            <a:cxnSpLocks/>
+          </p:cNvCxnSpPr>
+          <p:nvPr/>
+        </p:nvCxnSpPr>
+        <p:spPr>
+          <a:xfrm>
+            <a:off x="5862394" y="2371613"/>
+            <a:ext cx="2165341" cy="1"/>
+          </a:xfrm>
+          <a:prstGeom prst="straightConnector1">
+            <a:avLst/>
+          </a:prstGeom>
+          <a:ln w="19050">
+            <a:solidFill>
+              <a:srgbClr val="7030A0"/>
+            </a:solidFill>
+            <a:tailEnd type="arrow"/>
+          </a:ln>
+        </p:spPr>
+        <p:style>
+          <a:lnRef idx="1">
+            <a:schemeClr val="accent1"/>
+          </a:lnRef>
+          <a:fillRef idx="0">
+            <a:schemeClr val="accent1"/>
+          </a:fillRef>
+          <a:effectRef idx="0">
+            <a:schemeClr val="accent1"/>
+          </a:effectRef>
+          <a:fontRef idx="minor">
+            <a:schemeClr val="tx1"/>
+          </a:fontRef>
+        </p:style>
+      </p:cxnSp>
+      <p:sp>
+        <p:nvSpPr>
+          <p:cNvPr id="73" name="TextBox 72">
+            <a:extLst>
+              <a:ext uri="{FF2B5EF4-FFF2-40B4-BE49-F238E27FC236}">
+                <a16:creationId xmlns:a16="http://schemas.microsoft.com/office/drawing/2014/main" id="{57128DD5-B6A8-4C1A-8977-B18ABACBCC38}"/>
+              </a:ext>
+            </a:extLst>
+          </p:cNvPr>
+          <p:cNvSpPr txBox="1"/>
+          <p:nvPr/>
+        </p:nvSpPr>
+        <p:spPr>
+          <a:xfrm>
+            <a:off x="6302772" y="2162947"/>
+            <a:ext cx="2438400" cy="161583"/>
+          </a:xfrm>
+          <a:prstGeom prst="rect">
+            <a:avLst/>
+          </a:prstGeom>
+          <a:noFill/>
+        </p:spPr>
+        <p:txBody>
+          <a:bodyPr wrap="square" lIns="0" tIns="0" rIns="0" bIns="0" rtlCol="0">
+            <a:spAutoFit/>
+          </a:bodyPr>
+          <a:lstStyle/>
+          <a:p>
+            <a:r>
+              <a:rPr lang="en-US" sz="1050" dirty="0">
+                <a:solidFill>
+                  <a:schemeClr val="accent5">
+                    <a:lumMod val="75000"/>
+                  </a:schemeClr>
+                </a:solidFill>
+              </a:rPr>
+              <a:t>post(</a:t>
+            </a:r>
+            <a:r>
+              <a:rPr lang="en-SG" sz="1050" dirty="0" err="1">
+                <a:solidFill>
+                  <a:schemeClr val="accent5">
+                    <a:lumMod val="75000"/>
+                  </a:schemeClr>
+                </a:solidFill>
+              </a:rPr>
+              <a:t>SaveUserChangedEvent</a:t>
             </a:r>
             <a:r>
               <a:rPr lang="en-US" sz="1050" dirty="0">
@@ -5784,7 +6527,7 @@
         </p:nvCxnSpPr>
         <p:spPr>
           <a:xfrm flipH="1" flipV="1">
-            <a:off x="3113202" y="2907712"/>
+            <a:off x="3113202" y="3212519"/>
             <a:ext cx="2616709" cy="5279"/>
           </a:xfrm>
           <a:prstGeom prst="straightConnector1">
@@ -5828,7 +6571,7 @@
         </p:nvCxnSpPr>
         <p:spPr>
           <a:xfrm flipH="1" flipV="1">
-            <a:off x="3111246" y="2145495"/>
+            <a:off x="3111246" y="2756720"/>
             <a:ext cx="2616709" cy="5279"/>
           </a:xfrm>
           <a:prstGeom prst="straightConnector1">
@@ -6050,13 +6793,15 @@
               </a:ext>
             </a:extLst>
           </p:cNvPr>
-          <p:cNvCxnSpPr/>
+          <p:cNvCxnSpPr>
+            <a:cxnSpLocks/>
+          </p:cNvCxnSpPr>
           <p:nvPr/>
         </p:nvCxnSpPr>
         <p:spPr>
           <a:xfrm>
             <a:off x="5789933" y="1011010"/>
-            <a:ext cx="0" cy="2550673"/>
+            <a:ext cx="0" cy="3103790"/>
           </a:xfrm>
           <a:prstGeom prst="line">
             <a:avLst/>
@@ -6330,7 +7075,7 @@
         </p:nvGrpSpPr>
         <p:grpSpPr>
           <a:xfrm flipH="1">
-            <a:off x="8522485" y="1367478"/>
+            <a:off x="8522485" y="1323978"/>
             <a:ext cx="217349" cy="270072"/>
             <a:chOff x="1028134" y="5612032"/>
             <a:chExt cx="217349" cy="270072"/>
@@ -6508,7 +7253,7 @@
         <p:spPr>
           <a:xfrm>
             <a:off x="8803963" y="1107515"/>
-            <a:ext cx="539047" cy="323165"/>
+            <a:ext cx="1025837" cy="484748"/>
           </a:xfrm>
           <a:prstGeom prst="rect">
             <a:avLst/>
@@ -6548,7 +7293,27 @@
                   </a:schemeClr>
                 </a:solidFill>
               </a:rPr>
-              <a:t>to file</a:t>
+              <a:t>to </a:t>
+            </a:r>
+            <a:r>
+              <a:rPr lang="en-US" sz="1050" dirty="0" err="1">
+                <a:solidFill>
+                  <a:schemeClr val="accent6">
+                    <a:lumMod val="75000"/>
+                  </a:schemeClr>
+                </a:solidFill>
+              </a:rPr>
+              <a:t>CredentialStore</a:t>
+            </a:r>
+            <a:r>
+              <a:rPr lang="en-US" sz="1050" dirty="0">
+                <a:solidFill>
+                  <a:schemeClr val="accent6">
+                    <a:lumMod val="75000"/>
+                  </a:schemeClr>
+                </a:solidFill>
+              </a:rPr>
+              <a:t> file</a:t>
             </a:r>
           </a:p>
         </p:txBody>
@@ -6567,7 +7332,7 @@
         </p:nvGrpSpPr>
         <p:grpSpPr>
           <a:xfrm>
-            <a:off x="1954352" y="1922037"/>
+            <a:off x="1954352" y="2533262"/>
             <a:ext cx="1142170" cy="514745"/>
             <a:chOff x="1497152" y="2324488"/>
             <a:chExt cx="1142170" cy="514745"/>
@@ -6853,7 +7618,7 @@
         </p:nvGrpSpPr>
         <p:grpSpPr>
           <a:xfrm>
-            <a:off x="1953299" y="2685655"/>
+            <a:off x="1953299" y="2990462"/>
             <a:ext cx="1142170" cy="514745"/>
             <a:chOff x="-40370" y="2761854"/>
             <a:chExt cx="1142170" cy="514745"/>
@@ -7246,7 +8011,7 @@
         </p:nvCxnSpPr>
         <p:spPr>
           <a:xfrm>
-            <a:off x="4144594" y="2011505"/>
+            <a:off x="4148835" y="3130368"/>
             <a:ext cx="1559022" cy="0"/>
           </a:xfrm>
           <a:prstGeom prst="straightConnector1">
@@ -7288,7 +8053,7 @@
         </p:nvSpPr>
         <p:spPr>
           <a:xfrm>
-            <a:off x="3200394" y="1841475"/>
+            <a:off x="3124200" y="2505417"/>
             <a:ext cx="2438400" cy="161583"/>
           </a:xfrm>
           <a:prstGeom prst="rect">
@@ -7352,7 +8117,7 @@
         </p:nvCxnSpPr>
         <p:spPr>
           <a:xfrm>
-            <a:off x="4144594" y="2748534"/>
+            <a:off x="4144594" y="2667000"/>
             <a:ext cx="1563263" cy="0"/>
           </a:xfrm>
           <a:prstGeom prst="straightConnector1">
@@ -7394,7 +8159,7 @@
         </p:nvSpPr>
         <p:spPr>
           <a:xfrm>
-            <a:off x="3199601" y="2564207"/>
+            <a:off x="3124200" y="2962617"/>
             <a:ext cx="2438400" cy="161583"/>
           </a:xfrm>
           <a:prstGeom prst="rect">
@@ -7588,98 +8353,6 @@
           </a:p>
         </p:txBody>
       </p:sp>
-      <p:cxnSp>
-        <p:nvCxnSpPr>
-          <p:cNvPr id="49" name="Straight Arrow Connector 48">
-            <a:extLst>
-              <a:ext uri="{FF2B5EF4-FFF2-40B4-BE49-F238E27FC236}">
-                <a16:creationId xmlns:a16="http://schemas.microsoft.com/office/drawing/2014/main" id="{494DBAAA-3AAA-43BB-8E8E-A6E1F08D30CE}"/>
-              </a:ext>
-            </a:extLst>
-          </p:cNvPr>
-          <p:cNvCxnSpPr>
-            <a:cxnSpLocks/>
-          </p:cNvCxnSpPr>
-          <p:nvPr/>
-        </p:nvCxnSpPr>
-        <p:spPr>
-          <a:xfrm flipH="1">
-            <a:off x="3111246" y="2432020"/>
-            <a:ext cx="2592370" cy="0"/>
-          </a:xfrm>
-          <a:prstGeom prst="straightConnector1">
-            <a:avLst/>
-          </a:prstGeom>
-          <a:ln w="19050">
-            <a:solidFill>
-              <a:srgbClr val="00B050"/>
-            </a:solidFill>
-            <a:prstDash val="sysDash"/>
-            <a:headEnd type="arrow" w="med" len="med"/>
-            <a:tailEnd type="none" w="med" len="med"/>
-          </a:ln>
-        </p:spPr>
-        <p:style>
-          <a:lnRef idx="1">
-            <a:schemeClr val="accent1"/>
-          </a:lnRef>
-          <a:fillRef idx="0">
-            <a:schemeClr val="accent1"/>
-          </a:fillRef>
-          <a:effectRef idx="0">
-            <a:schemeClr val="accent1"/>
-          </a:effectRef>
-          <a:fontRef idx="minor">
-            <a:schemeClr val="tx1"/>
-          </a:fontRef>
-        </p:style>
-      </p:cxnSp>
-      <p:cxnSp>
-        <p:nvCxnSpPr>
-          <p:cNvPr id="52" name="Straight Arrow Connector 51">
-            <a:extLst>
-              <a:ext uri="{FF2B5EF4-FFF2-40B4-BE49-F238E27FC236}">
-                <a16:creationId xmlns:a16="http://schemas.microsoft.com/office/drawing/2014/main" id="{87BBFA73-FF62-4BB3-BF7E-D25D15AED9FB}"/>
-              </a:ext>
-            </a:extLst>
-          </p:cNvPr>
-          <p:cNvCxnSpPr>
-            <a:cxnSpLocks/>
-          </p:cNvCxnSpPr>
-          <p:nvPr/>
-        </p:nvCxnSpPr>
-        <p:spPr>
-          <a:xfrm flipH="1">
-            <a:off x="3111246" y="3190676"/>
-            <a:ext cx="2592370" cy="0"/>
-          </a:xfrm>
-          <a:prstGeom prst="straightConnector1">
-            <a:avLst/>
-          </a:prstGeom>
-          <a:ln w="19050">
-            <a:solidFill>
-              <a:srgbClr val="00B050"/>
-            </a:solidFill>
-            <a:prstDash val="sysDash"/>
-            <a:headEnd type="arrow" w="med" len="med"/>
-            <a:tailEnd type="none" w="med" len="med"/>
-          </a:ln>
-        </p:spPr>
-        <p:style>
-          <a:lnRef idx="1">
-            <a:schemeClr val="accent1"/>
-          </a:lnRef>
-          <a:fillRef idx="0">
-            <a:schemeClr val="accent1"/>
-          </a:fillRef>
-          <a:effectRef idx="0">
-            <a:schemeClr val="accent1"/>
-          </a:effectRef>
-          <a:fontRef idx="minor">
-            <a:schemeClr val="tx1"/>
-          </a:fontRef>
-        </p:style>
-      </p:cxnSp>
       <p:sp>
         <p:nvSpPr>
           <p:cNvPr id="10" name="Rectangle 9">
@@ -7694,8 +8367,8 @@
         </p:nvSpPr>
         <p:spPr>
           <a:xfrm>
-            <a:off x="5713570" y="1998637"/>
-            <a:ext cx="142006" cy="1354156"/>
+            <a:off x="5713570" y="2667000"/>
+            <a:ext cx="142006" cy="990600"/>
           </a:xfrm>
           <a:prstGeom prst="rect">
             <a:avLst/>
@@ -7753,7 +8426,7 @@
         </p:nvCxnSpPr>
         <p:spPr>
           <a:xfrm flipH="1">
-            <a:off x="4191000" y="3346443"/>
+            <a:off x="4191000" y="3651250"/>
             <a:ext cx="1606274" cy="0"/>
           </a:xfrm>
           <a:prstGeom prst="straightConnector1">
@@ -7768,6 +8441,628 @@
             <a:prstDash val="sysDash"/>
             <a:headEnd type="none" w="med" len="med"/>
             <a:tailEnd type="arrow" w="med" len="med"/>
+          </a:ln>
+        </p:spPr>
+        <p:style>
+          <a:lnRef idx="1">
+            <a:schemeClr val="accent1"/>
+          </a:lnRef>
+          <a:fillRef idx="0">
+            <a:schemeClr val="accent1"/>
+          </a:fillRef>
+          <a:effectRef idx="0">
+            <a:schemeClr val="accent1"/>
+          </a:effectRef>
+          <a:fontRef idx="minor">
+            <a:schemeClr val="tx1"/>
+          </a:fontRef>
+        </p:style>
+      </p:cxnSp>
+      <p:sp>
+        <p:nvSpPr>
+          <p:cNvPr id="43" name="Rectangle 42">
+            <a:extLst>
+              <a:ext uri="{FF2B5EF4-FFF2-40B4-BE49-F238E27FC236}">
+                <a16:creationId xmlns:a16="http://schemas.microsoft.com/office/drawing/2014/main" id="{6EF39A5A-28EC-4C51-BEB1-11BF7901BB7E}"/>
+              </a:ext>
+            </a:extLst>
+          </p:cNvPr>
+          <p:cNvSpPr/>
+          <p:nvPr/>
+        </p:nvSpPr>
+        <p:spPr>
+          <a:xfrm>
+            <a:off x="5713570" y="1908309"/>
+            <a:ext cx="142006" cy="441298"/>
+          </a:xfrm>
+          <a:prstGeom prst="rect">
+            <a:avLst/>
+          </a:prstGeom>
+          <a:solidFill>
+            <a:schemeClr val="accent5">
+              <a:lumMod val="75000"/>
+            </a:schemeClr>
+          </a:solidFill>
+          <a:ln>
+            <a:solidFill>
+              <a:schemeClr val="accent5">
+                <a:lumMod val="75000"/>
+              </a:schemeClr>
+            </a:solidFill>
+          </a:ln>
+          <a:effectLst/>
+        </p:spPr>
+        <p:style>
+          <a:lnRef idx="1">
+            <a:schemeClr val="accent3"/>
+          </a:lnRef>
+          <a:fillRef idx="2">
+            <a:schemeClr val="accent3"/>
+          </a:fillRef>
+          <a:effectRef idx="1">
+            <a:schemeClr val="accent3"/>
+          </a:effectRef>
+          <a:fontRef idx="minor">
+            <a:schemeClr val="dk1"/>
+          </a:fontRef>
+        </p:style>
+        <p:txBody>
+          <a:bodyPr rtlCol="0" anchor="ctr"/>
+          <a:lstStyle/>
+          <a:p>
+            <a:pPr algn="ctr"/>
+            <a:endParaRPr lang="en-SG" sz="1400"/>
+          </a:p>
+        </p:txBody>
+      </p:sp>
+      <p:sp>
+        <p:nvSpPr>
+          <p:cNvPr id="44" name="Rectangle 43">
+            <a:extLst>
+              <a:ext uri="{FF2B5EF4-FFF2-40B4-BE49-F238E27FC236}">
+                <a16:creationId xmlns:a16="http://schemas.microsoft.com/office/drawing/2014/main" id="{778AD8AD-F9E5-445F-BBEB-96463B9CA847}"/>
+              </a:ext>
+            </a:extLst>
+          </p:cNvPr>
+          <p:cNvSpPr/>
+          <p:nvPr/>
+        </p:nvSpPr>
+        <p:spPr>
+          <a:xfrm>
+            <a:off x="8431077" y="1986612"/>
+            <a:ext cx="124478" cy="287409"/>
+          </a:xfrm>
+          <a:prstGeom prst="rect">
+            <a:avLst/>
+          </a:prstGeom>
+          <a:solidFill>
+            <a:schemeClr val="accent6">
+              <a:lumMod val="75000"/>
+            </a:schemeClr>
+          </a:solidFill>
+          <a:ln>
+            <a:solidFill>
+              <a:schemeClr val="accent6">
+                <a:lumMod val="75000"/>
+              </a:schemeClr>
+            </a:solidFill>
+          </a:ln>
+          <a:effectLst/>
+        </p:spPr>
+        <p:style>
+          <a:lnRef idx="1">
+            <a:schemeClr val="accent3"/>
+          </a:lnRef>
+          <a:fillRef idx="2">
+            <a:schemeClr val="accent3"/>
+          </a:fillRef>
+          <a:effectRef idx="1">
+            <a:schemeClr val="accent3"/>
+          </a:effectRef>
+          <a:fontRef idx="minor">
+            <a:schemeClr val="dk1"/>
+          </a:fontRef>
+        </p:style>
+        <p:txBody>
+          <a:bodyPr rtlCol="0" anchor="ctr"/>
+          <a:lstStyle/>
+          <a:p>
+            <a:pPr algn="ctr"/>
+            <a:endParaRPr lang="en-SG" sz="1400"/>
+          </a:p>
+        </p:txBody>
+      </p:sp>
+      <p:grpSp>
+        <p:nvGrpSpPr>
+          <p:cNvPr id="45" name="Group 44">
+            <a:extLst>
+              <a:ext uri="{FF2B5EF4-FFF2-40B4-BE49-F238E27FC236}">
+                <a16:creationId xmlns:a16="http://schemas.microsoft.com/office/drawing/2014/main" id="{D45BF292-A7B0-4475-8E29-8A2BA5359D9B}"/>
+              </a:ext>
+            </a:extLst>
+          </p:cNvPr>
+          <p:cNvGrpSpPr/>
+          <p:nvPr/>
+        </p:nvGrpSpPr>
+        <p:grpSpPr>
+          <a:xfrm flipH="1">
+            <a:off x="8522933" y="1943111"/>
+            <a:ext cx="217349" cy="270072"/>
+            <a:chOff x="1028134" y="5612032"/>
+            <a:chExt cx="217349" cy="270072"/>
+          </a:xfrm>
+        </p:grpSpPr>
+        <p:sp>
+          <p:nvSpPr>
+            <p:cNvPr id="46" name="Freeform 53">
+              <a:extLst>
+                <a:ext uri="{FF2B5EF4-FFF2-40B4-BE49-F238E27FC236}">
+                  <a16:creationId xmlns:a16="http://schemas.microsoft.com/office/drawing/2014/main" id="{F5B5BCC8-5E2C-4C86-A0D6-96AC427D8B70}"/>
+                </a:ext>
+              </a:extLst>
+            </p:cNvPr>
+            <p:cNvSpPr/>
+            <p:nvPr/>
+          </p:nvSpPr>
+          <p:spPr>
+            <a:xfrm rot="2600998" flipH="1" flipV="1">
+              <a:off x="1028134" y="5612032"/>
+              <a:ext cx="167452" cy="116880"/>
+            </a:xfrm>
+            <a:custGeom>
+              <a:avLst/>
+              <a:gdLst>
+                <a:gd name="connsiteX0" fmla="*/ 0 w 226400"/>
+                <a:gd name="connsiteY0" fmla="*/ 32920 h 171466"/>
+                <a:gd name="connsiteX1" fmla="*/ 157018 w 226400"/>
+                <a:gd name="connsiteY1" fmla="*/ 5211 h 171466"/>
+                <a:gd name="connsiteX2" fmla="*/ 221673 w 226400"/>
+                <a:gd name="connsiteY2" fmla="*/ 125284 h 171466"/>
+                <a:gd name="connsiteX3" fmla="*/ 36945 w 226400"/>
+                <a:gd name="connsiteY3" fmla="*/ 171466 h 171466"/>
+              </a:gdLst>
+              <a:ahLst/>
+              <a:cxnLst>
+                <a:cxn ang="0">
+                  <a:pos x="connsiteX0" y="connsiteY0"/>
+                </a:cxn>
+                <a:cxn ang="0">
+                  <a:pos x="connsiteX1" y="connsiteY1"/>
+                </a:cxn>
+                <a:cxn ang="0">
+                  <a:pos x="connsiteX2" y="connsiteY2"/>
+                </a:cxn>
+                <a:cxn ang="0">
+                  <a:pos x="connsiteX3" y="connsiteY3"/>
+                </a:cxn>
+              </a:cxnLst>
+              <a:rect l="l" t="t" r="r" b="b"/>
+              <a:pathLst>
+                <a:path w="226400" h="171466">
+                  <a:moveTo>
+                    <a:pt x="0" y="32920"/>
+                  </a:moveTo>
+                  <a:cubicBezTo>
+                    <a:pt x="60036" y="11368"/>
+                    <a:pt x="120073" y="-10183"/>
+                    <a:pt x="157018" y="5211"/>
+                  </a:cubicBezTo>
+                  <a:cubicBezTo>
+                    <a:pt x="193963" y="20605"/>
+                    <a:pt x="241685" y="97575"/>
+                    <a:pt x="221673" y="125284"/>
+                  </a:cubicBezTo>
+                  <a:cubicBezTo>
+                    <a:pt x="201661" y="152993"/>
+                    <a:pt x="119303" y="162229"/>
+                    <a:pt x="36945" y="171466"/>
+                  </a:cubicBezTo>
+                </a:path>
+              </a:pathLst>
+            </a:custGeom>
+            <a:ln w="19050">
+              <a:solidFill>
+                <a:schemeClr val="accent6">
+                  <a:lumMod val="75000"/>
+                </a:schemeClr>
+              </a:solidFill>
+              <a:headEnd type="arrow" w="med" len="med"/>
+              <a:tailEnd type="none" w="med" len="med"/>
+            </a:ln>
+          </p:spPr>
+          <p:style>
+            <a:lnRef idx="1">
+              <a:schemeClr val="accent1"/>
+            </a:lnRef>
+            <a:fillRef idx="0">
+              <a:schemeClr val="accent1"/>
+            </a:fillRef>
+            <a:effectRef idx="0">
+              <a:schemeClr val="accent1"/>
+            </a:effectRef>
+            <a:fontRef idx="minor">
+              <a:schemeClr val="tx1"/>
+            </a:fontRef>
+          </p:style>
+          <p:txBody>
+            <a:bodyPr rtlCol="0" anchor="ctr"/>
+            <a:lstStyle/>
+            <a:p>
+              <a:pPr algn="ctr"/>
+              <a:endParaRPr lang="en-SG"/>
+            </a:p>
+          </p:txBody>
+        </p:sp>
+        <p:sp>
+          <p:nvSpPr>
+            <p:cNvPr id="47" name="Rectangle 46">
+              <a:extLst>
+                <a:ext uri="{FF2B5EF4-FFF2-40B4-BE49-F238E27FC236}">
+                  <a16:creationId xmlns:a16="http://schemas.microsoft.com/office/drawing/2014/main" id="{ABC44830-53BD-41CE-BB35-24503BE0B259}"/>
+                </a:ext>
+              </a:extLst>
+            </p:cNvPr>
+            <p:cNvSpPr/>
+            <p:nvPr/>
+          </p:nvSpPr>
+          <p:spPr>
+            <a:xfrm>
+              <a:off x="1147403" y="5712513"/>
+              <a:ext cx="98080" cy="169591"/>
+            </a:xfrm>
+            <a:prstGeom prst="rect">
+              <a:avLst/>
+            </a:prstGeom>
+            <a:solidFill>
+              <a:schemeClr val="accent6">
+                <a:lumMod val="75000"/>
+              </a:schemeClr>
+            </a:solidFill>
+            <a:ln>
+              <a:solidFill>
+                <a:schemeClr val="bg1"/>
+              </a:solidFill>
+            </a:ln>
+            <a:effectLst/>
+          </p:spPr>
+          <p:style>
+            <a:lnRef idx="1">
+              <a:schemeClr val="accent3"/>
+            </a:lnRef>
+            <a:fillRef idx="2">
+              <a:schemeClr val="accent3"/>
+            </a:fillRef>
+            <a:effectRef idx="1">
+              <a:schemeClr val="accent3"/>
+            </a:effectRef>
+            <a:fontRef idx="minor">
+              <a:schemeClr val="dk1"/>
+            </a:fontRef>
+          </p:style>
+          <p:txBody>
+            <a:bodyPr rtlCol="0" anchor="ctr"/>
+            <a:lstStyle/>
+            <a:p>
+              <a:pPr algn="ctr"/>
+              <a:endParaRPr lang="en-SG" sz="1400"/>
+            </a:p>
+          </p:txBody>
+        </p:sp>
+      </p:grpSp>
+      <p:sp>
+        <p:nvSpPr>
+          <p:cNvPr id="50" name="TextBox 49">
+            <a:extLst>
+              <a:ext uri="{FF2B5EF4-FFF2-40B4-BE49-F238E27FC236}">
+                <a16:creationId xmlns:a16="http://schemas.microsoft.com/office/drawing/2014/main" id="{D1C6FAC1-20EA-481C-A826-22C990105CEB}"/>
+              </a:ext>
+            </a:extLst>
+          </p:cNvPr>
+          <p:cNvSpPr txBox="1"/>
+          <p:nvPr/>
+        </p:nvSpPr>
+        <p:spPr>
+          <a:xfrm>
+            <a:off x="8804411" y="1726648"/>
+            <a:ext cx="873437" cy="323165"/>
+          </a:xfrm>
+          <a:prstGeom prst="rect">
+            <a:avLst/>
+          </a:prstGeom>
+          <a:noFill/>
+        </p:spPr>
+        <p:txBody>
+          <a:bodyPr wrap="square" lIns="0" tIns="0" rIns="0" bIns="0" rtlCol="0">
+            <a:spAutoFit/>
+          </a:bodyPr>
+          <a:lstStyle/>
+          <a:p>
+            <a:r>
+              <a:rPr lang="en-US" sz="1050" dirty="0">
+                <a:solidFill>
+                  <a:schemeClr val="accent6">
+                    <a:lumMod val="75000"/>
+                  </a:schemeClr>
+                </a:solidFill>
+              </a:rPr>
+              <a:t>Save </a:t>
+            </a:r>
+            <a:br>
+              <a:rPr lang="en-US" sz="1050" dirty="0">
+                <a:solidFill>
+                  <a:schemeClr val="accent6">
+                    <a:lumMod val="75000"/>
+                  </a:schemeClr>
+                </a:solidFill>
+              </a:rPr>
+            </a:br>
+            <a:r>
+              <a:rPr lang="en-US" sz="1050" dirty="0">
+                <a:solidFill>
+                  <a:schemeClr val="accent6">
+                    <a:lumMod val="75000"/>
+                  </a:schemeClr>
+                </a:solidFill>
+              </a:rPr>
+              <a:t>to </a:t>
+            </a:r>
+            <a:r>
+              <a:rPr lang="en-US" sz="1050" dirty="0" err="1">
+                <a:solidFill>
+                  <a:schemeClr val="accent6">
+                    <a:lumMod val="75000"/>
+                  </a:schemeClr>
+                </a:solidFill>
+              </a:rPr>
+              <a:t>UserData</a:t>
+            </a:r>
+            <a:r>
+              <a:rPr lang="en-US" sz="1050" dirty="0">
+                <a:solidFill>
+                  <a:schemeClr val="accent6">
+                    <a:lumMod val="75000"/>
+                  </a:schemeClr>
+                </a:solidFill>
+              </a:rPr>
+              <a:t> file</a:t>
+            </a:r>
+          </a:p>
+        </p:txBody>
+      </p:sp>
+      <p:cxnSp>
+        <p:nvCxnSpPr>
+          <p:cNvPr id="51" name="Straight Arrow Connector 50">
+            <a:extLst>
+              <a:ext uri="{FF2B5EF4-FFF2-40B4-BE49-F238E27FC236}">
+                <a16:creationId xmlns:a16="http://schemas.microsoft.com/office/drawing/2014/main" id="{2851AB39-59D7-4918-85EB-0E93E2723F64}"/>
+              </a:ext>
+            </a:extLst>
+          </p:cNvPr>
+          <p:cNvCxnSpPr>
+            <a:cxnSpLocks/>
+          </p:cNvCxnSpPr>
+          <p:nvPr/>
+        </p:nvCxnSpPr>
+        <p:spPr>
+          <a:xfrm flipH="1">
+            <a:off x="5868133" y="2268588"/>
+            <a:ext cx="2647657" cy="0"/>
+          </a:xfrm>
+          <a:prstGeom prst="straightConnector1">
+            <a:avLst/>
+          </a:prstGeom>
+          <a:ln w="19050">
+            <a:solidFill>
+              <a:schemeClr val="accent6">
+                <a:lumMod val="75000"/>
+              </a:schemeClr>
+            </a:solidFill>
+            <a:prstDash val="sysDash"/>
+            <a:headEnd type="none" w="med" len="med"/>
+            <a:tailEnd type="arrow" w="med" len="med"/>
+          </a:ln>
+        </p:spPr>
+        <p:style>
+          <a:lnRef idx="1">
+            <a:schemeClr val="accent1"/>
+          </a:lnRef>
+          <a:fillRef idx="0">
+            <a:schemeClr val="accent1"/>
+          </a:fillRef>
+          <a:effectRef idx="0">
+            <a:schemeClr val="accent1"/>
+          </a:effectRef>
+          <a:fontRef idx="minor">
+            <a:schemeClr val="tx1"/>
+          </a:fontRef>
+        </p:style>
+      </p:cxnSp>
+      <p:cxnSp>
+        <p:nvCxnSpPr>
+          <p:cNvPr id="53" name="Straight Arrow Connector 52">
+            <a:extLst>
+              <a:ext uri="{FF2B5EF4-FFF2-40B4-BE49-F238E27FC236}">
+                <a16:creationId xmlns:a16="http://schemas.microsoft.com/office/drawing/2014/main" id="{AF891BA7-D5C1-47FE-BCE2-B0CA7C876D4B}"/>
+              </a:ext>
+            </a:extLst>
+          </p:cNvPr>
+          <p:cNvCxnSpPr>
+            <a:cxnSpLocks/>
+          </p:cNvCxnSpPr>
+          <p:nvPr/>
+        </p:nvCxnSpPr>
+        <p:spPr>
+          <a:xfrm>
+            <a:off x="5772648" y="1986249"/>
+            <a:ext cx="2645387" cy="0"/>
+          </a:xfrm>
+          <a:prstGeom prst="straightConnector1">
+            <a:avLst/>
+          </a:prstGeom>
+          <a:ln w="19050">
+            <a:solidFill>
+              <a:schemeClr val="accent5">
+                <a:lumMod val="75000"/>
+              </a:schemeClr>
+            </a:solidFill>
+            <a:headEnd type="none" w="med" len="med"/>
+            <a:tailEnd type="arrow" w="med" len="med"/>
+          </a:ln>
+        </p:spPr>
+        <p:style>
+          <a:lnRef idx="1">
+            <a:schemeClr val="accent1"/>
+          </a:lnRef>
+          <a:fillRef idx="0">
+            <a:schemeClr val="accent1"/>
+          </a:fillRef>
+          <a:effectRef idx="0">
+            <a:schemeClr val="accent1"/>
+          </a:effectRef>
+          <a:fontRef idx="minor">
+            <a:schemeClr val="tx1"/>
+          </a:fontRef>
+        </p:style>
+      </p:cxnSp>
+      <p:sp>
+        <p:nvSpPr>
+          <p:cNvPr id="54" name="TextBox 53">
+            <a:extLst>
+              <a:ext uri="{FF2B5EF4-FFF2-40B4-BE49-F238E27FC236}">
+                <a16:creationId xmlns:a16="http://schemas.microsoft.com/office/drawing/2014/main" id="{54B83608-28B3-4F01-B7AA-CD38662858B3}"/>
+              </a:ext>
+            </a:extLst>
+          </p:cNvPr>
+          <p:cNvSpPr txBox="1"/>
+          <p:nvPr/>
+        </p:nvSpPr>
+        <p:spPr>
+          <a:xfrm>
+            <a:off x="6015842" y="1792190"/>
+            <a:ext cx="2659870" cy="161583"/>
+          </a:xfrm>
+          <a:prstGeom prst="rect">
+            <a:avLst/>
+          </a:prstGeom>
+          <a:noFill/>
+        </p:spPr>
+        <p:txBody>
+          <a:bodyPr wrap="square" lIns="0" tIns="0" rIns="0" bIns="0" rtlCol="0">
+            <a:spAutoFit/>
+          </a:bodyPr>
+          <a:lstStyle/>
+          <a:p>
+            <a:r>
+              <a:rPr lang="en-SG" sz="1050" dirty="0" err="1">
+                <a:solidFill>
+                  <a:schemeClr val="accent6">
+                    <a:lumMod val="75000"/>
+                  </a:schemeClr>
+                </a:solidFill>
+              </a:rPr>
+              <a:t>handleSaveUserChangedEvent</a:t>
+            </a:r>
+            <a:r>
+              <a:rPr lang="en-US" sz="1050" dirty="0">
+                <a:solidFill>
+                  <a:schemeClr val="accent6">
+                    <a:lumMod val="75000"/>
+                  </a:schemeClr>
+                </a:solidFill>
+              </a:rPr>
+              <a:t>()</a:t>
+            </a:r>
+          </a:p>
+        </p:txBody>
+      </p:sp>
+      <p:sp>
+        <p:nvSpPr>
+          <p:cNvPr id="56" name="TextBox 55">
+            <a:extLst>
+              <a:ext uri="{FF2B5EF4-FFF2-40B4-BE49-F238E27FC236}">
+                <a16:creationId xmlns:a16="http://schemas.microsoft.com/office/drawing/2014/main" id="{8D0E2341-7779-4289-8739-2AE2A0428882}"/>
+              </a:ext>
+            </a:extLst>
+          </p:cNvPr>
+          <p:cNvSpPr txBox="1"/>
+          <p:nvPr/>
+        </p:nvSpPr>
+        <p:spPr>
+          <a:xfrm>
+            <a:off x="3623888" y="1711918"/>
+            <a:ext cx="2009134" cy="161583"/>
+          </a:xfrm>
+          <a:prstGeom prst="rect">
+            <a:avLst/>
+          </a:prstGeom>
+          <a:noFill/>
+        </p:spPr>
+        <p:txBody>
+          <a:bodyPr wrap="square" lIns="0" tIns="0" rIns="0" bIns="0" rtlCol="0">
+            <a:spAutoFit/>
+          </a:bodyPr>
+          <a:lstStyle/>
+          <a:p>
+            <a:r>
+              <a:rPr lang="en-US" sz="1050" dirty="0">
+                <a:solidFill>
+                  <a:schemeClr val="accent5">
+                    <a:lumMod val="75000"/>
+                  </a:schemeClr>
+                </a:solidFill>
+              </a:rPr>
+              <a:t>post(</a:t>
+            </a:r>
+            <a:r>
+              <a:rPr lang="en-SG" sz="1050" dirty="0" err="1">
+                <a:solidFill>
+                  <a:schemeClr val="accent5">
+                    <a:lumMod val="75000"/>
+                  </a:schemeClr>
+                </a:solidFill>
+              </a:rPr>
+              <a:t>SaveUserChangedEvent</a:t>
+            </a:r>
+            <a:r>
+              <a:rPr lang="en-US" sz="1050" dirty="0">
+                <a:solidFill>
+                  <a:schemeClr val="accent5">
+                    <a:lumMod val="75000"/>
+                  </a:schemeClr>
+                </a:solidFill>
+              </a:rPr>
+              <a:t>)</a:t>
+            </a:r>
+          </a:p>
+        </p:txBody>
+      </p:sp>
+      <p:cxnSp>
+        <p:nvCxnSpPr>
+          <p:cNvPr id="57" name="Straight Arrow Connector 56">
+            <a:extLst>
+              <a:ext uri="{FF2B5EF4-FFF2-40B4-BE49-F238E27FC236}">
+                <a16:creationId xmlns:a16="http://schemas.microsoft.com/office/drawing/2014/main" id="{43C2BC2E-51DD-4905-B51D-83BC00BC1885}"/>
+              </a:ext>
+            </a:extLst>
+          </p:cNvPr>
+          <p:cNvCxnSpPr>
+            <a:cxnSpLocks/>
+          </p:cNvCxnSpPr>
+          <p:nvPr/>
+        </p:nvCxnSpPr>
+        <p:spPr>
+          <a:xfrm>
+            <a:off x="4185228" y="1913792"/>
+            <a:ext cx="1524699" cy="0"/>
+          </a:xfrm>
+          <a:prstGeom prst="straightConnector1">
+            <a:avLst/>
+          </a:prstGeom>
+          <a:ln w="19050">
+            <a:solidFill>
+              <a:srgbClr val="7030A0"/>
+            </a:solidFill>
+            <a:tailEnd type="arrow"/>
           </a:ln>
         </p:spPr>
         <p:style>

</xml_diff>